<commit_message>
Minor changes of the tutorial schemas (concerning MD5 checks).
</commit_message>
<xml_diff>
--- a/declarative-amsterdam-2020/an-introduction-to-greenfox/introduction-to-greenfox-part1.pptx
+++ b/declarative-amsterdam-2020/an-introduction-to-greenfox/introduction-to-greenfox-part1.pptx
@@ -1369,14 +1369,6 @@
           <a:bodyPr/>
           <a:lstStyle/>
           <a:p>
-            <a:r>
-              <a:rPr lang="de-DE" smtClean="0"/>
-              <a:t>Upfront, it is important to understand that the</a:t>
-            </a:r>
-            <a:r>
-              <a:rPr lang="de-DE" baseline="0" smtClean="0"/>
-              <a:t> scope is not the file system as a whole – as investigated by an anti-virus program. No – the scope is a file system tree, consisting of an arbitrarily selected root folder and all folders and files directly or indirectly contained.</a:t>
-            </a:r>
             <a:endParaRPr lang="de-DE"/>
           </a:p>
         </p:txBody>
@@ -14954,7 +14946,11 @@
           <a:p>
             <a:r>
               <a:rPr lang="de-DE" smtClean="0"/>
-              <a:t>File system validation</a:t>
+              <a:t>File system </a:t>
+            </a:r>
+            <a:r>
+              <a:rPr lang="de-DE" smtClean="0"/>
+              <a:t>tree validation</a:t>
             </a:r>
             <a:endParaRPr lang="de-DE"/>
           </a:p>
@@ -15085,7 +15081,11 @@
           <a:p>
             <a:r>
               <a:rPr lang="de-DE" sz="2000" smtClean="0"/>
-              <a:t>   folders/files directly or indirectly contained</a:t>
+              <a:t>   folders/files </a:t>
+            </a:r>
+            <a:r>
+              <a:rPr lang="de-DE" sz="2000" smtClean="0"/>
+              <a:t>directly or indirectly contained</a:t>
             </a:r>
           </a:p>
         </p:txBody>
@@ -15355,34 +15355,52 @@
               <a:t>declarative validation of </a:t>
             </a:r>
             <a:r>
+              <a:rPr lang="de-DE" sz="2000" b="1" smtClean="0"/>
+              <a:t>single files</a:t>
+            </a:r>
+            <a:r>
+              <a:rPr lang="de-DE" sz="2000" smtClean="0"/>
+              <a:t> against schemas </a:t>
+            </a:r>
+          </a:p>
+          <a:p>
+            <a:pPr marL="0" indent="0">
+              <a:buNone/>
+            </a:pPr>
+            <a:r>
+              <a:rPr lang="de-DE" sz="2000" smtClean="0"/>
+              <a:t>             (XSD, RelaxNG, JSON Schema, SHACL, …)</a:t>
+            </a:r>
+          </a:p>
+          <a:p>
+            <a:endParaRPr lang="de-DE" sz="2000" smtClean="0"/>
+          </a:p>
+          <a:p>
+            <a:r>
+              <a:rPr lang="de-DE" sz="2000" smtClean="0"/>
+              <a:t>Real interest: validity of </a:t>
+            </a:r>
+            <a:r>
+              <a:rPr lang="de-DE" sz="2000" b="1" smtClean="0">
+                <a:solidFill>
+                  <a:srgbClr val="CC6600"/>
+                </a:solidFill>
+              </a:rPr>
+              <a:t>systems</a:t>
+            </a:r>
+            <a:r>
+              <a:rPr lang="de-DE" sz="2000" smtClean="0"/>
+              <a:t>, not individual files</a:t>
+            </a:r>
+          </a:p>
+          <a:p>
+            <a:r>
               <a:rPr lang="de-DE" sz="2000" b="1" smtClean="0">
                 <a:solidFill>
                   <a:srgbClr val="006600"/>
                 </a:solidFill>
               </a:rPr>
-              <a:t>single files</a:t>
-            </a:r>
-            <a:r>
-              <a:rPr lang="de-DE" sz="2000" smtClean="0"/>
-              <a:t> against schemas </a:t>
-            </a:r>
-          </a:p>
-          <a:p>
-            <a:pPr marL="0" indent="0">
-              <a:buNone/>
-            </a:pPr>
-            <a:r>
-              <a:rPr lang="de-DE" sz="2000" smtClean="0"/>
-              <a:t>             (XSD, RelaxNG, JSON Schema, SHACL, …)</a:t>
-            </a:r>
-          </a:p>
-          <a:p>
-            <a:endParaRPr lang="de-DE" sz="2000" smtClean="0"/>
-          </a:p>
-          <a:p>
-            <a:r>
-              <a:rPr lang="de-DE" sz="2000" smtClean="0"/>
-              <a:t>Real interest: validity of </a:t>
+              <a:t>Single </a:t>
             </a:r>
             <a:r>
               <a:rPr lang="de-DE" sz="2000" b="1" smtClean="0">
@@ -15390,17 +15408,11 @@
                   <a:srgbClr val="006600"/>
                 </a:solidFill>
               </a:rPr>
-              <a:t>systems</a:t>
+              <a:t>file</a:t>
             </a:r>
             <a:r>
               <a:rPr lang="de-DE" sz="2000" smtClean="0"/>
-              <a:t>, not individual files</a:t>
-            </a:r>
-          </a:p>
-          <a:p>
-            <a:r>
-              <a:rPr lang="de-DE" sz="2000" smtClean="0"/>
-              <a:t>Individual file: a tiny jigsaw piece in the picture of system validity</a:t>
+              <a:t>: a tiny jigsaw piece in the picture of system validity</a:t>
             </a:r>
           </a:p>
           <a:p>
@@ -15414,7 +15426,27 @@
             </a:r>
             <a:r>
               <a:rPr lang="de-DE" sz="2000" smtClean="0"/>
-              <a:t> are many pieces fitting together; content examples:</a:t>
+              <a:t> are </a:t>
+            </a:r>
+            <a:r>
+              <a:rPr lang="de-DE" sz="2000" smtClean="0"/>
+              <a:t>simply </a:t>
+            </a:r>
+            <a:r>
+              <a:rPr lang="de-DE" sz="2000" b="1" i="1" smtClean="0">
+                <a:solidFill>
+                  <a:srgbClr val="CC6600"/>
+                </a:solidFill>
+              </a:rPr>
+              <a:t>larger parts of the picture</a:t>
+            </a:r>
+            <a:r>
+              <a:rPr lang="de-DE" sz="2000" smtClean="0"/>
+              <a:t>; examples</a:t>
+            </a:r>
+            <a:r>
+              <a:rPr lang="de-DE" sz="2000" smtClean="0"/>
+              <a:t>:</a:t>
             </a:r>
           </a:p>
           <a:p>
@@ -15810,6 +15842,13 @@
   <p:clrMapOvr>
     <a:masterClrMapping/>
   </p:clrMapOvr>
+  <p:timing>
+    <p:tnLst>
+      <p:par>
+        <p:cTn id="1" dur="indefinite" restart="never" nodeType="tmRoot"/>
+      </p:par>
+    </p:tnLst>
+  </p:timing>
 </p:sld>
 </file>
 
@@ -15869,32 +15908,76 @@
           <a:lstStyle/>
           <a:p>
             <a:r>
+              <a:rPr lang="de-DE" smtClean="0">
+                <a:solidFill>
+                  <a:srgbClr val="006600"/>
+                </a:solidFill>
+              </a:rPr>
+              <a:t>Guided tour</a:t>
+            </a:r>
+            <a:r>
               <a:rPr lang="de-DE" smtClean="0"/>
-              <a:t>Guided tour – hands-on impressions</a:t>
-            </a:r>
-          </a:p>
-          <a:p>
+              <a:t> – hands-on impressions</a:t>
+            </a:r>
+          </a:p>
+          <a:p>
+            <a:r>
+              <a:rPr lang="de-DE" smtClean="0">
+                <a:solidFill>
+                  <a:srgbClr val="006600"/>
+                </a:solidFill>
+              </a:rPr>
+              <a:t>Big Picture</a:t>
+            </a:r>
             <a:r>
               <a:rPr lang="de-DE" smtClean="0"/>
-              <a:t>Big Picture – concepts and major features</a:t>
-            </a:r>
-          </a:p>
-          <a:p>
+              <a:t> – concepts and major features</a:t>
+            </a:r>
+          </a:p>
+          <a:p>
+            <a:r>
+              <a:rPr lang="de-DE" smtClean="0">
+                <a:solidFill>
+                  <a:srgbClr val="006600"/>
+                </a:solidFill>
+              </a:rPr>
+              <a:t>Overview</a:t>
+            </a:r>
             <a:r>
               <a:rPr lang="de-DE" smtClean="0"/>
-              <a:t>Overview of available constraint types</a:t>
-            </a:r>
-          </a:p>
-          <a:p>
+              <a:t> of available constraint types</a:t>
+            </a:r>
+          </a:p>
+          <a:p>
+            <a:r>
+              <a:rPr lang="de-DE" smtClean="0">
+                <a:solidFill>
+                  <a:srgbClr val="006600"/>
+                </a:solidFill>
+              </a:rPr>
+              <a:t>Zooming in</a:t>
+            </a:r>
             <a:r>
               <a:rPr lang="de-DE" smtClean="0"/>
-              <a:t>Closer look at a few constraint types</a:t>
-            </a:r>
-          </a:p>
-          <a:p>
+              <a:t> - look </a:t>
+            </a:r>
             <a:r>
               <a:rPr lang="de-DE" smtClean="0"/>
-              <a:t>What now – an outlook</a:t>
+              <a:t>at a few constraint types</a:t>
+            </a:r>
+          </a:p>
+          <a:p>
+            <a:r>
+              <a:rPr lang="de-DE" smtClean="0">
+                <a:solidFill>
+                  <a:srgbClr val="006600"/>
+                </a:solidFill>
+              </a:rPr>
+              <a:t>What now</a:t>
+            </a:r>
+            <a:r>
+              <a:rPr lang="de-DE" smtClean="0"/>
+              <a:t> – an outlook</a:t>
             </a:r>
           </a:p>
           <a:p>
@@ -15993,6 +16076,13 @@
   <p:clrMapOvr>
     <a:masterClrMapping/>
   </p:clrMapOvr>
+  <p:timing>
+    <p:tnLst>
+      <p:par>
+        <p:cTn id="1" dur="indefinite" restart="never" nodeType="tmRoot"/>
+      </p:par>
+    </p:tnLst>
+  </p:timing>
 </p:sld>
 </file>
 
@@ -16199,6 +16289,13 @@
   <p:clrMapOvr>
     <a:masterClrMapping/>
   </p:clrMapOvr>
+  <p:timing>
+    <p:tnLst>
+      <p:par>
+        <p:cTn id="1" dur="indefinite" restart="never" nodeType="tmRoot"/>
+      </p:par>
+    </p:tnLst>
+  </p:timing>
 </p:sld>
 </file>
 

</xml_diff>

<commit_message>
Extended Amsterdam Powerpoint presentation.
</commit_message>
<xml_diff>
--- a/declarative-amsterdam-2020/an-introduction-to-greenfox/introduction-to-greenfox-part1.pptx
+++ b/declarative-amsterdam-2020/an-introduction-to-greenfox/introduction-to-greenfox-part1.pptx
@@ -5,10 +5,10 @@
     <p:sldMasterId id="2147483710" r:id="rId1"/>
   </p:sldMasterIdLst>
   <p:notesMasterIdLst>
-    <p:notesMasterId r:id="rId7"/>
+    <p:notesMasterId r:id="rId18"/>
   </p:notesMasterIdLst>
   <p:handoutMasterIdLst>
-    <p:handoutMasterId r:id="rId8"/>
+    <p:handoutMasterId r:id="rId19"/>
   </p:handoutMasterIdLst>
   <p:sldIdLst>
     <p:sldId id="925" r:id="rId2"/>
@@ -16,6 +16,17 @@
     <p:sldId id="1220" r:id="rId4"/>
     <p:sldId id="1221" r:id="rId5"/>
     <p:sldId id="1222" r:id="rId6"/>
+    <p:sldId id="1223" r:id="rId7"/>
+    <p:sldId id="1224" r:id="rId8"/>
+    <p:sldId id="1225" r:id="rId9"/>
+    <p:sldId id="1226" r:id="rId10"/>
+    <p:sldId id="1227" r:id="rId11"/>
+    <p:sldId id="1228" r:id="rId12"/>
+    <p:sldId id="1229" r:id="rId13"/>
+    <p:sldId id="1230" r:id="rId14"/>
+    <p:sldId id="1231" r:id="rId15"/>
+    <p:sldId id="1233" r:id="rId16"/>
+    <p:sldId id="1232" r:id="rId17"/>
   </p:sldIdLst>
   <p:sldSz cx="9144000" cy="6858000" type="screen4x3"/>
   <p:notesSz cx="6858000" cy="9945688"/>
@@ -1406,6 +1417,456 @@
     <p:extLst>
       <p:ext uri="{BB962C8B-B14F-4D97-AF65-F5344CB8AC3E}">
         <p14:creationId xmlns:p14="http://schemas.microsoft.com/office/powerpoint/2010/main" val="3553369863"/>
+      </p:ext>
+    </p:extLst>
+  </p:cSld>
+  <p:clrMapOvr>
+    <a:masterClrMapping/>
+  </p:clrMapOvr>
+</p:notes>
+</file>
+
+<file path=ppt/notesSlides/notesSlide3.xml><?xml version="1.0" encoding="utf-8"?>
+<p:notes xmlns:a="http://schemas.openxmlformats.org/drawingml/2006/main" xmlns:r="http://schemas.openxmlformats.org/officeDocument/2006/relationships" xmlns:p="http://schemas.openxmlformats.org/presentationml/2006/main">
+  <p:cSld>
+    <p:spTree>
+      <p:nvGrpSpPr>
+        <p:cNvPr id="1" name=""/>
+        <p:cNvGrpSpPr/>
+        <p:nvPr/>
+      </p:nvGrpSpPr>
+      <p:grpSpPr>
+        <a:xfrm>
+          <a:off x="0" y="0"/>
+          <a:ext cx="0" cy="0"/>
+          <a:chOff x="0" y="0"/>
+          <a:chExt cx="0" cy="0"/>
+        </a:xfrm>
+      </p:grpSpPr>
+      <p:sp>
+        <p:nvSpPr>
+          <p:cNvPr id="2" name="Slide Image Placeholder 1"/>
+          <p:cNvSpPr>
+            <a:spLocks noGrp="1" noRot="1" noChangeAspect="1"/>
+          </p:cNvSpPr>
+          <p:nvPr>
+            <p:ph type="sldImg"/>
+          </p:nvPr>
+        </p:nvSpPr>
+        <p:spPr/>
+      </p:sp>
+      <p:sp>
+        <p:nvSpPr>
+          <p:cNvPr id="3" name="Notes Placeholder 2"/>
+          <p:cNvSpPr>
+            <a:spLocks noGrp="1"/>
+          </p:cNvSpPr>
+          <p:nvPr>
+            <p:ph type="body" idx="1"/>
+          </p:nvPr>
+        </p:nvSpPr>
+        <p:spPr/>
+        <p:txBody>
+          <a:bodyPr/>
+          <a:lstStyle/>
+          <a:p>
+            <a:endParaRPr lang="de-DE"/>
+          </a:p>
+        </p:txBody>
+      </p:sp>
+      <p:sp>
+        <p:nvSpPr>
+          <p:cNvPr id="4" name="Slide Number Placeholder 3"/>
+          <p:cNvSpPr>
+            <a:spLocks noGrp="1"/>
+          </p:cNvSpPr>
+          <p:nvPr>
+            <p:ph type="sldNum" sz="quarter" idx="10"/>
+          </p:nvPr>
+        </p:nvSpPr>
+        <p:spPr/>
+        <p:txBody>
+          <a:bodyPr/>
+          <a:lstStyle/>
+          <a:p>
+            <a:pPr>
+              <a:defRPr/>
+            </a:pPr>
+            <a:fld id="{C808F741-F631-4E00-8D1F-D4687A839150}" type="slidenum">
+              <a:rPr lang="de-DE" altLang="de-DE" smtClean="0"/>
+              <a:pPr>
+                <a:defRPr/>
+              </a:pPr>
+              <a:t>10</a:t>
+            </a:fld>
+            <a:endParaRPr lang="de-DE" altLang="de-DE"/>
+          </a:p>
+        </p:txBody>
+      </p:sp>
+    </p:spTree>
+    <p:extLst>
+      <p:ext uri="{BB962C8B-B14F-4D97-AF65-F5344CB8AC3E}">
+        <p14:creationId xmlns:p14="http://schemas.microsoft.com/office/powerpoint/2010/main" val="313278684"/>
+      </p:ext>
+    </p:extLst>
+  </p:cSld>
+  <p:clrMapOvr>
+    <a:masterClrMapping/>
+  </p:clrMapOvr>
+</p:notes>
+</file>
+
+<file path=ppt/notesSlides/notesSlide4.xml><?xml version="1.0" encoding="utf-8"?>
+<p:notes xmlns:a="http://schemas.openxmlformats.org/drawingml/2006/main" xmlns:r="http://schemas.openxmlformats.org/officeDocument/2006/relationships" xmlns:p="http://schemas.openxmlformats.org/presentationml/2006/main">
+  <p:cSld>
+    <p:spTree>
+      <p:nvGrpSpPr>
+        <p:cNvPr id="1" name=""/>
+        <p:cNvGrpSpPr/>
+        <p:nvPr/>
+      </p:nvGrpSpPr>
+      <p:grpSpPr>
+        <a:xfrm>
+          <a:off x="0" y="0"/>
+          <a:ext cx="0" cy="0"/>
+          <a:chOff x="0" y="0"/>
+          <a:chExt cx="0" cy="0"/>
+        </a:xfrm>
+      </p:grpSpPr>
+      <p:sp>
+        <p:nvSpPr>
+          <p:cNvPr id="2" name="Slide Image Placeholder 1"/>
+          <p:cNvSpPr>
+            <a:spLocks noGrp="1" noRot="1" noChangeAspect="1"/>
+          </p:cNvSpPr>
+          <p:nvPr>
+            <p:ph type="sldImg"/>
+          </p:nvPr>
+        </p:nvSpPr>
+        <p:spPr/>
+      </p:sp>
+      <p:sp>
+        <p:nvSpPr>
+          <p:cNvPr id="3" name="Notes Placeholder 2"/>
+          <p:cNvSpPr>
+            <a:spLocks noGrp="1"/>
+          </p:cNvSpPr>
+          <p:nvPr>
+            <p:ph type="body" idx="1"/>
+          </p:nvPr>
+        </p:nvSpPr>
+        <p:spPr/>
+        <p:txBody>
+          <a:bodyPr/>
+          <a:lstStyle/>
+          <a:p>
+            <a:endParaRPr lang="de-DE"/>
+          </a:p>
+        </p:txBody>
+      </p:sp>
+      <p:sp>
+        <p:nvSpPr>
+          <p:cNvPr id="4" name="Slide Number Placeholder 3"/>
+          <p:cNvSpPr>
+            <a:spLocks noGrp="1"/>
+          </p:cNvSpPr>
+          <p:nvPr>
+            <p:ph type="sldNum" sz="quarter" idx="10"/>
+          </p:nvPr>
+        </p:nvSpPr>
+        <p:spPr/>
+        <p:txBody>
+          <a:bodyPr/>
+          <a:lstStyle/>
+          <a:p>
+            <a:pPr>
+              <a:defRPr/>
+            </a:pPr>
+            <a:fld id="{C808F741-F631-4E00-8D1F-D4687A839150}" type="slidenum">
+              <a:rPr lang="de-DE" altLang="de-DE" smtClean="0"/>
+              <a:pPr>
+                <a:defRPr/>
+              </a:pPr>
+              <a:t>11</a:t>
+            </a:fld>
+            <a:endParaRPr lang="de-DE" altLang="de-DE"/>
+          </a:p>
+        </p:txBody>
+      </p:sp>
+    </p:spTree>
+    <p:extLst>
+      <p:ext uri="{BB962C8B-B14F-4D97-AF65-F5344CB8AC3E}">
+        <p14:creationId xmlns:p14="http://schemas.microsoft.com/office/powerpoint/2010/main" val="3774928196"/>
+      </p:ext>
+    </p:extLst>
+  </p:cSld>
+  <p:clrMapOvr>
+    <a:masterClrMapping/>
+  </p:clrMapOvr>
+</p:notes>
+</file>
+
+<file path=ppt/notesSlides/notesSlide5.xml><?xml version="1.0" encoding="utf-8"?>
+<p:notes xmlns:a="http://schemas.openxmlformats.org/drawingml/2006/main" xmlns:r="http://schemas.openxmlformats.org/officeDocument/2006/relationships" xmlns:p="http://schemas.openxmlformats.org/presentationml/2006/main">
+  <p:cSld>
+    <p:spTree>
+      <p:nvGrpSpPr>
+        <p:cNvPr id="1" name=""/>
+        <p:cNvGrpSpPr/>
+        <p:nvPr/>
+      </p:nvGrpSpPr>
+      <p:grpSpPr>
+        <a:xfrm>
+          <a:off x="0" y="0"/>
+          <a:ext cx="0" cy="0"/>
+          <a:chOff x="0" y="0"/>
+          <a:chExt cx="0" cy="0"/>
+        </a:xfrm>
+      </p:grpSpPr>
+      <p:sp>
+        <p:nvSpPr>
+          <p:cNvPr id="2" name="Slide Image Placeholder 1"/>
+          <p:cNvSpPr>
+            <a:spLocks noGrp="1" noRot="1" noChangeAspect="1"/>
+          </p:cNvSpPr>
+          <p:nvPr>
+            <p:ph type="sldImg"/>
+          </p:nvPr>
+        </p:nvSpPr>
+        <p:spPr/>
+      </p:sp>
+      <p:sp>
+        <p:nvSpPr>
+          <p:cNvPr id="3" name="Notes Placeholder 2"/>
+          <p:cNvSpPr>
+            <a:spLocks noGrp="1"/>
+          </p:cNvSpPr>
+          <p:nvPr>
+            <p:ph type="body" idx="1"/>
+          </p:nvPr>
+        </p:nvSpPr>
+        <p:spPr/>
+        <p:txBody>
+          <a:bodyPr/>
+          <a:lstStyle/>
+          <a:p>
+            <a:endParaRPr lang="de-DE"/>
+          </a:p>
+        </p:txBody>
+      </p:sp>
+      <p:sp>
+        <p:nvSpPr>
+          <p:cNvPr id="4" name="Slide Number Placeholder 3"/>
+          <p:cNvSpPr>
+            <a:spLocks noGrp="1"/>
+          </p:cNvSpPr>
+          <p:nvPr>
+            <p:ph type="sldNum" sz="quarter" idx="10"/>
+          </p:nvPr>
+        </p:nvSpPr>
+        <p:spPr/>
+        <p:txBody>
+          <a:bodyPr/>
+          <a:lstStyle/>
+          <a:p>
+            <a:pPr>
+              <a:defRPr/>
+            </a:pPr>
+            <a:fld id="{C808F741-F631-4E00-8D1F-D4687A839150}" type="slidenum">
+              <a:rPr lang="de-DE" altLang="de-DE" smtClean="0"/>
+              <a:pPr>
+                <a:defRPr/>
+              </a:pPr>
+              <a:t>13</a:t>
+            </a:fld>
+            <a:endParaRPr lang="de-DE" altLang="de-DE"/>
+          </a:p>
+        </p:txBody>
+      </p:sp>
+    </p:spTree>
+    <p:extLst>
+      <p:ext uri="{BB962C8B-B14F-4D97-AF65-F5344CB8AC3E}">
+        <p14:creationId xmlns:p14="http://schemas.microsoft.com/office/powerpoint/2010/main" val="3791317520"/>
+      </p:ext>
+    </p:extLst>
+  </p:cSld>
+  <p:clrMapOvr>
+    <a:masterClrMapping/>
+  </p:clrMapOvr>
+</p:notes>
+</file>
+
+<file path=ppt/notesSlides/notesSlide6.xml><?xml version="1.0" encoding="utf-8"?>
+<p:notes xmlns:a="http://schemas.openxmlformats.org/drawingml/2006/main" xmlns:r="http://schemas.openxmlformats.org/officeDocument/2006/relationships" xmlns:p="http://schemas.openxmlformats.org/presentationml/2006/main">
+  <p:cSld>
+    <p:spTree>
+      <p:nvGrpSpPr>
+        <p:cNvPr id="1" name=""/>
+        <p:cNvGrpSpPr/>
+        <p:nvPr/>
+      </p:nvGrpSpPr>
+      <p:grpSpPr>
+        <a:xfrm>
+          <a:off x="0" y="0"/>
+          <a:ext cx="0" cy="0"/>
+          <a:chOff x="0" y="0"/>
+          <a:chExt cx="0" cy="0"/>
+        </a:xfrm>
+      </p:grpSpPr>
+      <p:sp>
+        <p:nvSpPr>
+          <p:cNvPr id="2" name="Slide Image Placeholder 1"/>
+          <p:cNvSpPr>
+            <a:spLocks noGrp="1" noRot="1" noChangeAspect="1"/>
+          </p:cNvSpPr>
+          <p:nvPr>
+            <p:ph type="sldImg"/>
+          </p:nvPr>
+        </p:nvSpPr>
+        <p:spPr/>
+      </p:sp>
+      <p:sp>
+        <p:nvSpPr>
+          <p:cNvPr id="3" name="Notes Placeholder 2"/>
+          <p:cNvSpPr>
+            <a:spLocks noGrp="1"/>
+          </p:cNvSpPr>
+          <p:nvPr>
+            <p:ph type="body" idx="1"/>
+          </p:nvPr>
+        </p:nvSpPr>
+        <p:spPr/>
+        <p:txBody>
+          <a:bodyPr/>
+          <a:lstStyle/>
+          <a:p>
+            <a:endParaRPr lang="de-DE"/>
+          </a:p>
+        </p:txBody>
+      </p:sp>
+      <p:sp>
+        <p:nvSpPr>
+          <p:cNvPr id="4" name="Slide Number Placeholder 3"/>
+          <p:cNvSpPr>
+            <a:spLocks noGrp="1"/>
+          </p:cNvSpPr>
+          <p:nvPr>
+            <p:ph type="sldNum" sz="quarter" idx="10"/>
+          </p:nvPr>
+        </p:nvSpPr>
+        <p:spPr/>
+        <p:txBody>
+          <a:bodyPr/>
+          <a:lstStyle/>
+          <a:p>
+            <a:pPr>
+              <a:defRPr/>
+            </a:pPr>
+            <a:fld id="{C808F741-F631-4E00-8D1F-D4687A839150}" type="slidenum">
+              <a:rPr lang="de-DE" altLang="de-DE" smtClean="0"/>
+              <a:pPr>
+                <a:defRPr/>
+              </a:pPr>
+              <a:t>14</a:t>
+            </a:fld>
+            <a:endParaRPr lang="de-DE" altLang="de-DE"/>
+          </a:p>
+        </p:txBody>
+      </p:sp>
+    </p:spTree>
+    <p:extLst>
+      <p:ext uri="{BB962C8B-B14F-4D97-AF65-F5344CB8AC3E}">
+        <p14:creationId xmlns:p14="http://schemas.microsoft.com/office/powerpoint/2010/main" val="3628521820"/>
+      </p:ext>
+    </p:extLst>
+  </p:cSld>
+  <p:clrMapOvr>
+    <a:masterClrMapping/>
+  </p:clrMapOvr>
+</p:notes>
+</file>
+
+<file path=ppt/notesSlides/notesSlide7.xml><?xml version="1.0" encoding="utf-8"?>
+<p:notes xmlns:a="http://schemas.openxmlformats.org/drawingml/2006/main" xmlns:r="http://schemas.openxmlformats.org/officeDocument/2006/relationships" xmlns:p="http://schemas.openxmlformats.org/presentationml/2006/main">
+  <p:cSld>
+    <p:spTree>
+      <p:nvGrpSpPr>
+        <p:cNvPr id="1" name=""/>
+        <p:cNvGrpSpPr/>
+        <p:nvPr/>
+      </p:nvGrpSpPr>
+      <p:grpSpPr>
+        <a:xfrm>
+          <a:off x="0" y="0"/>
+          <a:ext cx="0" cy="0"/>
+          <a:chOff x="0" y="0"/>
+          <a:chExt cx="0" cy="0"/>
+        </a:xfrm>
+      </p:grpSpPr>
+      <p:sp>
+        <p:nvSpPr>
+          <p:cNvPr id="2" name="Slide Image Placeholder 1"/>
+          <p:cNvSpPr>
+            <a:spLocks noGrp="1" noRot="1" noChangeAspect="1"/>
+          </p:cNvSpPr>
+          <p:nvPr>
+            <p:ph type="sldImg"/>
+          </p:nvPr>
+        </p:nvSpPr>
+        <p:spPr/>
+      </p:sp>
+      <p:sp>
+        <p:nvSpPr>
+          <p:cNvPr id="3" name="Notes Placeholder 2"/>
+          <p:cNvSpPr>
+            <a:spLocks noGrp="1"/>
+          </p:cNvSpPr>
+          <p:nvPr>
+            <p:ph type="body" idx="1"/>
+          </p:nvPr>
+        </p:nvSpPr>
+        <p:spPr/>
+        <p:txBody>
+          <a:bodyPr/>
+          <a:lstStyle/>
+          <a:p>
+            <a:endParaRPr lang="de-DE"/>
+          </a:p>
+        </p:txBody>
+      </p:sp>
+      <p:sp>
+        <p:nvSpPr>
+          <p:cNvPr id="4" name="Slide Number Placeholder 3"/>
+          <p:cNvSpPr>
+            <a:spLocks noGrp="1"/>
+          </p:cNvSpPr>
+          <p:nvPr>
+            <p:ph type="sldNum" sz="quarter" idx="10"/>
+          </p:nvPr>
+        </p:nvSpPr>
+        <p:spPr/>
+        <p:txBody>
+          <a:bodyPr/>
+          <a:lstStyle/>
+          <a:p>
+            <a:pPr>
+              <a:defRPr/>
+            </a:pPr>
+            <a:fld id="{C808F741-F631-4E00-8D1F-D4687A839150}" type="slidenum">
+              <a:rPr lang="de-DE" altLang="de-DE" smtClean="0"/>
+              <a:pPr>
+                <a:defRPr/>
+              </a:pPr>
+              <a:t>15</a:t>
+            </a:fld>
+            <a:endParaRPr lang="de-DE" altLang="de-DE"/>
+          </a:p>
+        </p:txBody>
+      </p:sp>
+    </p:spTree>
+    <p:extLst>
+      <p:ext uri="{BB962C8B-B14F-4D97-AF65-F5344CB8AC3E}">
+        <p14:creationId xmlns:p14="http://schemas.microsoft.com/office/powerpoint/2010/main" val="3841554130"/>
       </p:ext>
     </p:extLst>
   </p:cSld>
@@ -14912,6 +15373,2231 @@
 </p:sld>
 </file>
 
+<file path=ppt/slides/slide10.xml><?xml version="1.0" encoding="utf-8"?>
+<p:sld xmlns:a="http://schemas.openxmlformats.org/drawingml/2006/main" xmlns:r="http://schemas.openxmlformats.org/officeDocument/2006/relationships" xmlns:p="http://schemas.openxmlformats.org/presentationml/2006/main">
+  <p:cSld>
+    <p:spTree>
+      <p:nvGrpSpPr>
+        <p:cNvPr id="1" name=""/>
+        <p:cNvGrpSpPr/>
+        <p:nvPr/>
+      </p:nvGrpSpPr>
+      <p:grpSpPr>
+        <a:xfrm>
+          <a:off x="0" y="0"/>
+          <a:ext cx="0" cy="0"/>
+          <a:chOff x="0" y="0"/>
+          <a:chExt cx="0" cy="0"/>
+        </a:xfrm>
+      </p:grpSpPr>
+      <p:sp>
+        <p:nvSpPr>
+          <p:cNvPr id="2" name="Title 1"/>
+          <p:cNvSpPr>
+            <a:spLocks noGrp="1"/>
+          </p:cNvSpPr>
+          <p:nvPr>
+            <p:ph type="title"/>
+          </p:nvPr>
+        </p:nvSpPr>
+        <p:spPr/>
+        <p:txBody>
+          <a:bodyPr/>
+          <a:lstStyle/>
+          <a:p>
+            <a:r>
+              <a:rPr lang="de-DE" smtClean="0">
+                <a:solidFill>
+                  <a:srgbClr val="006600"/>
+                </a:solidFill>
+                <a:latin typeface="Calibri Light" panose="020F0302020204030204" pitchFamily="34" charset="0"/>
+                <a:cs typeface="Calibri Light" panose="020F0302020204030204" pitchFamily="34" charset="0"/>
+              </a:rPr>
+              <a:t>Constraints</a:t>
+            </a:r>
+            <a:endParaRPr lang="de-DE">
+              <a:solidFill>
+                <a:srgbClr val="006600"/>
+              </a:solidFill>
+              <a:latin typeface="Calibri Light" panose="020F0302020204030204" pitchFamily="34" charset="0"/>
+              <a:cs typeface="Calibri Light" panose="020F0302020204030204" pitchFamily="34" charset="0"/>
+            </a:endParaRPr>
+          </a:p>
+        </p:txBody>
+      </p:sp>
+      <p:sp>
+        <p:nvSpPr>
+          <p:cNvPr id="3" name="Content Placeholder 2"/>
+          <p:cNvSpPr>
+            <a:spLocks noGrp="1"/>
+          </p:cNvSpPr>
+          <p:nvPr>
+            <p:ph idx="1"/>
+          </p:nvPr>
+        </p:nvSpPr>
+        <p:spPr/>
+        <p:txBody>
+          <a:bodyPr/>
+          <a:lstStyle/>
+          <a:p>
+            <a:r>
+              <a:rPr lang="de-DE" sz="2400" smtClean="0">
+                <a:solidFill>
+                  <a:srgbClr val="006600"/>
+                </a:solidFill>
+                <a:latin typeface="Calibri Light" panose="020F0302020204030204" pitchFamily="34" charset="0"/>
+                <a:cs typeface="Calibri Light" panose="020F0302020204030204" pitchFamily="34" charset="0"/>
+              </a:rPr>
+              <a:t>A constraint is a function:</a:t>
+            </a:r>
+          </a:p>
+          <a:p>
+            <a:endParaRPr lang="de-DE" sz="2400">
+              <a:solidFill>
+                <a:srgbClr val="006600"/>
+              </a:solidFill>
+              <a:latin typeface="Calibri Light" panose="020F0302020204030204" pitchFamily="34" charset="0"/>
+              <a:cs typeface="Calibri Light" panose="020F0302020204030204" pitchFamily="34" charset="0"/>
+            </a:endParaRPr>
+          </a:p>
+          <a:p>
+            <a:endParaRPr lang="de-DE" sz="2400" smtClean="0">
+              <a:solidFill>
+                <a:srgbClr val="006600"/>
+              </a:solidFill>
+              <a:latin typeface="Calibri Light" panose="020F0302020204030204" pitchFamily="34" charset="0"/>
+              <a:cs typeface="Calibri Light" panose="020F0302020204030204" pitchFamily="34" charset="0"/>
+            </a:endParaRPr>
+          </a:p>
+          <a:p>
+            <a:endParaRPr lang="de-DE" sz="2400" smtClean="0">
+              <a:solidFill>
+                <a:srgbClr val="006600"/>
+              </a:solidFill>
+              <a:latin typeface="Calibri Light" panose="020F0302020204030204" pitchFamily="34" charset="0"/>
+              <a:cs typeface="Calibri Light" panose="020F0302020204030204" pitchFamily="34" charset="0"/>
+            </a:endParaRPr>
+          </a:p>
+          <a:p>
+            <a:r>
+              <a:rPr lang="de-DE" sz="2400" smtClean="0">
+                <a:solidFill>
+                  <a:srgbClr val="006600"/>
+                </a:solidFill>
+                <a:latin typeface="Calibri Light" panose="020F0302020204030204" pitchFamily="34" charset="0"/>
+                <a:cs typeface="Calibri Light" panose="020F0302020204030204" pitchFamily="34" charset="0"/>
+              </a:rPr>
+              <a:t>Selection of the resource is </a:t>
+            </a:r>
+            <a:r>
+              <a:rPr lang="de-DE" sz="2400" i="1" smtClean="0">
+                <a:solidFill>
+                  <a:srgbClr val="006600"/>
+                </a:solidFill>
+                <a:latin typeface="Calibri Light" panose="020F0302020204030204" pitchFamily="34" charset="0"/>
+                <a:cs typeface="Calibri Light" panose="020F0302020204030204" pitchFamily="34" charset="0"/>
+              </a:rPr>
+              <a:t>not</a:t>
+            </a:r>
+            <a:r>
+              <a:rPr lang="de-DE" sz="2400" smtClean="0">
+                <a:solidFill>
+                  <a:srgbClr val="006600"/>
+                </a:solidFill>
+                <a:latin typeface="Calibri Light" panose="020F0302020204030204" pitchFamily="34" charset="0"/>
+                <a:cs typeface="Calibri Light" panose="020F0302020204030204" pitchFamily="34" charset="0"/>
+              </a:rPr>
+              <a:t> part of the constraint –</a:t>
+            </a:r>
+          </a:p>
+          <a:p>
+            <a:pPr marL="0" indent="0">
+              <a:buNone/>
+            </a:pPr>
+            <a:r>
+              <a:rPr lang="de-DE" sz="2400">
+                <a:solidFill>
+                  <a:srgbClr val="006600"/>
+                </a:solidFill>
+                <a:latin typeface="Calibri Light" panose="020F0302020204030204" pitchFamily="34" charset="0"/>
+                <a:cs typeface="Calibri Light" panose="020F0302020204030204" pitchFamily="34" charset="0"/>
+              </a:rPr>
+              <a:t>	</a:t>
+            </a:r>
+            <a:r>
+              <a:rPr lang="de-DE" sz="2400" smtClean="0">
+                <a:solidFill>
+                  <a:srgbClr val="006600"/>
+                </a:solidFill>
+                <a:latin typeface="Calibri Light" panose="020F0302020204030204" pitchFamily="34" charset="0"/>
+                <a:cs typeface="Calibri Light" panose="020F0302020204030204" pitchFamily="34" charset="0"/>
+              </a:rPr>
+              <a:t>that‘s </a:t>
+            </a:r>
+            <a:r>
+              <a:rPr lang="de-DE" sz="2400">
+                <a:solidFill>
+                  <a:srgbClr val="006600"/>
+                </a:solidFill>
+                <a:latin typeface="Calibri Light" panose="020F0302020204030204" pitchFamily="34" charset="0"/>
+                <a:cs typeface="Calibri Light" panose="020F0302020204030204" pitchFamily="34" charset="0"/>
+              </a:rPr>
+              <a:t>the business of the containing </a:t>
+            </a:r>
+            <a:r>
+              <a:rPr lang="de-DE" sz="2400" u="sng">
+                <a:solidFill>
+                  <a:srgbClr val="006600"/>
+                </a:solidFill>
+                <a:latin typeface="Calibri Light" panose="020F0302020204030204" pitchFamily="34" charset="0"/>
+                <a:cs typeface="Calibri Light" panose="020F0302020204030204" pitchFamily="34" charset="0"/>
+              </a:rPr>
+              <a:t>shape</a:t>
+            </a:r>
+          </a:p>
+          <a:p>
+            <a:endParaRPr lang="de-DE" sz="2400">
+              <a:solidFill>
+                <a:srgbClr val="006600"/>
+              </a:solidFill>
+              <a:latin typeface="Calibri Light" panose="020F0302020204030204" pitchFamily="34" charset="0"/>
+              <a:cs typeface="Calibri Light" panose="020F0302020204030204" pitchFamily="34" charset="0"/>
+            </a:endParaRPr>
+          </a:p>
+          <a:p>
+            <a:r>
+              <a:rPr lang="de-DE" sz="2400" smtClean="0">
+                <a:solidFill>
+                  <a:srgbClr val="006600"/>
+                </a:solidFill>
+                <a:latin typeface="Calibri Light" panose="020F0302020204030204" pitchFamily="34" charset="0"/>
+                <a:cs typeface="Calibri Light" panose="020F0302020204030204" pitchFamily="34" charset="0"/>
+              </a:rPr>
+              <a:t>Schema representation: XML element + attributes + children</a:t>
+            </a:r>
+          </a:p>
+          <a:p>
+            <a:pPr marL="0" indent="0">
+              <a:buNone/>
+            </a:pPr>
+            <a:r>
+              <a:rPr lang="de-DE" sz="2400">
+                <a:solidFill>
+                  <a:srgbClr val="006600"/>
+                </a:solidFill>
+                <a:latin typeface="Calibri Light" panose="020F0302020204030204" pitchFamily="34" charset="0"/>
+                <a:cs typeface="Calibri Light" panose="020F0302020204030204" pitchFamily="34" charset="0"/>
+              </a:rPr>
+              <a:t>	</a:t>
+            </a:r>
+            <a:endParaRPr lang="de-DE" sz="2400" u="sng" smtClean="0">
+              <a:solidFill>
+                <a:srgbClr val="006600"/>
+              </a:solidFill>
+              <a:latin typeface="Calibri Light" panose="020F0302020204030204" pitchFamily="34" charset="0"/>
+              <a:cs typeface="Calibri Light" panose="020F0302020204030204" pitchFamily="34" charset="0"/>
+            </a:endParaRPr>
+          </a:p>
+          <a:p>
+            <a:pPr marL="0" indent="0">
+              <a:buNone/>
+            </a:pPr>
+            <a:endParaRPr lang="de-DE" sz="2400" u="sng" smtClean="0">
+              <a:solidFill>
+                <a:srgbClr val="006600"/>
+              </a:solidFill>
+              <a:latin typeface="Calibri Light" panose="020F0302020204030204" pitchFamily="34" charset="0"/>
+              <a:cs typeface="Calibri Light" panose="020F0302020204030204" pitchFamily="34" charset="0"/>
+            </a:endParaRPr>
+          </a:p>
+          <a:p>
+            <a:endParaRPr lang="de-DE" smtClean="0">
+              <a:solidFill>
+                <a:srgbClr val="006600"/>
+              </a:solidFill>
+              <a:latin typeface="Calibri Light" panose="020F0302020204030204" pitchFamily="34" charset="0"/>
+              <a:cs typeface="Calibri Light" panose="020F0302020204030204" pitchFamily="34" charset="0"/>
+            </a:endParaRPr>
+          </a:p>
+          <a:p>
+            <a:pPr marL="0" indent="0">
+              <a:buNone/>
+            </a:pPr>
+            <a:endParaRPr lang="de-DE">
+              <a:solidFill>
+                <a:srgbClr val="006600"/>
+              </a:solidFill>
+              <a:latin typeface="Calibri Light" panose="020F0302020204030204" pitchFamily="34" charset="0"/>
+              <a:cs typeface="Calibri Light" panose="020F0302020204030204" pitchFamily="34" charset="0"/>
+            </a:endParaRPr>
+          </a:p>
+        </p:txBody>
+      </p:sp>
+      <p:sp>
+        <p:nvSpPr>
+          <p:cNvPr id="6" name="Slide Number Placeholder 5"/>
+          <p:cNvSpPr>
+            <a:spLocks noGrp="1"/>
+          </p:cNvSpPr>
+          <p:nvPr>
+            <p:ph type="sldNum" sz="quarter" idx="12"/>
+          </p:nvPr>
+        </p:nvSpPr>
+        <p:spPr/>
+        <p:txBody>
+          <a:bodyPr/>
+          <a:lstStyle/>
+          <a:p>
+            <a:pPr>
+              <a:defRPr/>
+            </a:pPr>
+            <a:fld id="{F031B2F4-27D1-4E53-97CF-1947CD75B185}" type="slidenum">
+              <a:rPr lang="de-DE" altLang="en-US" smtClean="0"/>
+              <a:pPr>
+                <a:defRPr/>
+              </a:pPr>
+              <a:t>10</a:t>
+            </a:fld>
+            <a:endParaRPr lang="de-DE" altLang="en-US"/>
+          </a:p>
+        </p:txBody>
+      </p:sp>
+      <p:sp>
+        <p:nvSpPr>
+          <p:cNvPr id="8" name="TextBox 7"/>
+          <p:cNvSpPr txBox="1"/>
+          <p:nvPr/>
+        </p:nvSpPr>
+        <p:spPr>
+          <a:xfrm>
+            <a:off x="323528" y="2276872"/>
+            <a:ext cx="7416824" cy="830997"/>
+          </a:xfrm>
+          <a:prstGeom prst="rect">
+            <a:avLst/>
+          </a:prstGeom>
+          <a:noFill/>
+        </p:spPr>
+        <p:txBody>
+          <a:bodyPr wrap="square" rtlCol="0">
+            <a:spAutoFit/>
+          </a:bodyPr>
+          <a:lstStyle/>
+          <a:p>
+            <a:pPr marL="0" indent="0">
+              <a:buNone/>
+            </a:pPr>
+            <a:r>
+              <a:rPr lang="de-DE" sz="2400" b="0">
+                <a:solidFill>
+                  <a:srgbClr val="006600"/>
+                </a:solidFill>
+                <a:latin typeface="Calibri Light" panose="020F0302020204030204" pitchFamily="34" charset="0"/>
+                <a:cs typeface="Calibri Light" panose="020F0302020204030204" pitchFamily="34" charset="0"/>
+              </a:rPr>
+              <a:t>	Maps a </a:t>
+            </a:r>
+            <a:r>
+              <a:rPr lang="de-DE" sz="2400" b="0" u="sng">
+                <a:solidFill>
+                  <a:srgbClr val="006600"/>
+                </a:solidFill>
+                <a:latin typeface="Calibri Light" panose="020F0302020204030204" pitchFamily="34" charset="0"/>
+                <a:cs typeface="Calibri Light" panose="020F0302020204030204" pitchFamily="34" charset="0"/>
+              </a:rPr>
+              <a:t>resource</a:t>
+            </a:r>
+            <a:r>
+              <a:rPr lang="de-DE" sz="2400" b="0">
+                <a:solidFill>
+                  <a:srgbClr val="006600"/>
+                </a:solidFill>
+                <a:latin typeface="Calibri Light" panose="020F0302020204030204" pitchFamily="34" charset="0"/>
+                <a:cs typeface="Calibri Light" panose="020F0302020204030204" pitchFamily="34" charset="0"/>
+              </a:rPr>
+              <a:t> to a </a:t>
+            </a:r>
+            <a:r>
+              <a:rPr lang="de-DE" sz="2400" b="0" u="sng">
+                <a:solidFill>
+                  <a:srgbClr val="006600"/>
+                </a:solidFill>
+                <a:latin typeface="Calibri Light" panose="020F0302020204030204" pitchFamily="34" charset="0"/>
+                <a:cs typeface="Calibri Light" panose="020F0302020204030204" pitchFamily="34" charset="0"/>
+              </a:rPr>
+              <a:t>validation result</a:t>
+            </a:r>
+          </a:p>
+          <a:p>
+            <a:pPr marL="0" indent="0">
+              <a:buNone/>
+            </a:pPr>
+            <a:r>
+              <a:rPr lang="de-DE" sz="2400" b="0">
+                <a:solidFill>
+                  <a:srgbClr val="006600"/>
+                </a:solidFill>
+                <a:latin typeface="Calibri Light" panose="020F0302020204030204" pitchFamily="34" charset="0"/>
+                <a:cs typeface="Calibri Light" panose="020F0302020204030204" pitchFamily="34" charset="0"/>
+              </a:rPr>
+              <a:t>	</a:t>
+            </a:r>
+            <a:r>
+              <a:rPr lang="de-DE" sz="2400" b="0" smtClean="0">
+                <a:solidFill>
+                  <a:srgbClr val="006600"/>
+                </a:solidFill>
+                <a:latin typeface="Calibri Light" panose="020F0302020204030204" pitchFamily="34" charset="0"/>
+                <a:cs typeface="Calibri Light" panose="020F0302020204030204" pitchFamily="34" charset="0"/>
+              </a:rPr>
+              <a:t>    = pass|failure   +   details</a:t>
+            </a:r>
+            <a:endParaRPr lang="de-DE" sz="2400" b="0">
+              <a:solidFill>
+                <a:srgbClr val="006600"/>
+              </a:solidFill>
+              <a:latin typeface="Calibri Light" panose="020F0302020204030204" pitchFamily="34" charset="0"/>
+              <a:cs typeface="Calibri Light" panose="020F0302020204030204" pitchFamily="34" charset="0"/>
+            </a:endParaRPr>
+          </a:p>
+        </p:txBody>
+      </p:sp>
+      <p:pic>
+        <p:nvPicPr>
+          <p:cNvPr id="10" name="Picture 9"/>
+          <p:cNvPicPr>
+            <a:picLocks noChangeAspect="1"/>
+          </p:cNvPicPr>
+          <p:nvPr/>
+        </p:nvPicPr>
+        <p:blipFill>
+          <a:blip r:embed="rId3"/>
+          <a:stretch>
+            <a:fillRect/>
+          </a:stretch>
+        </p:blipFill>
+        <p:spPr>
+          <a:xfrm>
+            <a:off x="806532" y="5373216"/>
+            <a:ext cx="7509884" cy="1170806"/>
+          </a:xfrm>
+          <a:prstGeom prst="rect">
+            <a:avLst/>
+          </a:prstGeom>
+        </p:spPr>
+      </p:pic>
+    </p:spTree>
+    <p:extLst>
+      <p:ext uri="{BB962C8B-B14F-4D97-AF65-F5344CB8AC3E}">
+        <p14:creationId xmlns:p14="http://schemas.microsoft.com/office/powerpoint/2010/main" val="866902338"/>
+      </p:ext>
+    </p:extLst>
+  </p:cSld>
+  <p:clrMapOvr>
+    <a:masterClrMapping/>
+  </p:clrMapOvr>
+</p:sld>
+</file>
+
+<file path=ppt/slides/slide11.xml><?xml version="1.0" encoding="utf-8"?>
+<p:sld xmlns:a="http://schemas.openxmlformats.org/drawingml/2006/main" xmlns:r="http://schemas.openxmlformats.org/officeDocument/2006/relationships" xmlns:p="http://schemas.openxmlformats.org/presentationml/2006/main">
+  <p:cSld>
+    <p:spTree>
+      <p:nvGrpSpPr>
+        <p:cNvPr id="1" name=""/>
+        <p:cNvGrpSpPr/>
+        <p:nvPr/>
+      </p:nvGrpSpPr>
+      <p:grpSpPr>
+        <a:xfrm>
+          <a:off x="0" y="0"/>
+          <a:ext cx="0" cy="0"/>
+          <a:chOff x="0" y="0"/>
+          <a:chExt cx="0" cy="0"/>
+        </a:xfrm>
+      </p:grpSpPr>
+      <p:sp>
+        <p:nvSpPr>
+          <p:cNvPr id="2" name="Title 1"/>
+          <p:cNvSpPr>
+            <a:spLocks noGrp="1"/>
+          </p:cNvSpPr>
+          <p:nvPr>
+            <p:ph type="title"/>
+          </p:nvPr>
+        </p:nvSpPr>
+        <p:spPr/>
+        <p:txBody>
+          <a:bodyPr/>
+          <a:lstStyle/>
+          <a:p>
+            <a:r>
+              <a:rPr lang="de-DE" smtClean="0">
+                <a:solidFill>
+                  <a:srgbClr val="006600"/>
+                </a:solidFill>
+                <a:latin typeface="Calibri Light" panose="020F0302020204030204" pitchFamily="34" charset="0"/>
+                <a:cs typeface="Calibri Light" panose="020F0302020204030204" pitchFamily="34" charset="0"/>
+              </a:rPr>
+              <a:t>Constraints II</a:t>
+            </a:r>
+            <a:endParaRPr lang="de-DE">
+              <a:solidFill>
+                <a:srgbClr val="006600"/>
+              </a:solidFill>
+              <a:latin typeface="Calibri Light" panose="020F0302020204030204" pitchFamily="34" charset="0"/>
+              <a:cs typeface="Calibri Light" panose="020F0302020204030204" pitchFamily="34" charset="0"/>
+            </a:endParaRPr>
+          </a:p>
+        </p:txBody>
+      </p:sp>
+      <p:sp>
+        <p:nvSpPr>
+          <p:cNvPr id="3" name="Content Placeholder 2"/>
+          <p:cNvSpPr>
+            <a:spLocks noGrp="1"/>
+          </p:cNvSpPr>
+          <p:nvPr>
+            <p:ph idx="1"/>
+          </p:nvPr>
+        </p:nvSpPr>
+        <p:spPr/>
+        <p:txBody>
+          <a:bodyPr/>
+          <a:lstStyle/>
+          <a:p>
+            <a:r>
+              <a:rPr lang="de-DE" sz="2400" smtClean="0">
+                <a:solidFill>
+                  <a:srgbClr val="006600"/>
+                </a:solidFill>
+                <a:latin typeface="Calibri Light" panose="020F0302020204030204" pitchFamily="34" charset="0"/>
+                <a:cs typeface="Calibri Light" panose="020F0302020204030204" pitchFamily="34" charset="0"/>
+              </a:rPr>
+              <a:t>A constraint has a type, a set of parameters, a facet</a:t>
+            </a:r>
+          </a:p>
+          <a:p>
+            <a:pPr lvl="1"/>
+            <a:r>
+              <a:rPr lang="de-DE" sz="2000" smtClean="0">
+                <a:solidFill>
+                  <a:srgbClr val="006600"/>
+                </a:solidFill>
+                <a:latin typeface="Calibri Light" panose="020F0302020204030204" pitchFamily="34" charset="0"/>
+                <a:cs typeface="Calibri Light" panose="020F0302020204030204" pitchFamily="34" charset="0"/>
+              </a:rPr>
+              <a:t>The type is identified by the XML element name</a:t>
+            </a:r>
+          </a:p>
+          <a:p>
+            <a:pPr lvl="1"/>
+            <a:r>
+              <a:rPr lang="de-DE" sz="2000" smtClean="0">
+                <a:solidFill>
+                  <a:srgbClr val="006600"/>
+                </a:solidFill>
+                <a:latin typeface="Calibri Light" panose="020F0302020204030204" pitchFamily="34" charset="0"/>
+                <a:cs typeface="Calibri Light" panose="020F0302020204030204" pitchFamily="34" charset="0"/>
+              </a:rPr>
+              <a:t>The parameters are provided by attributes / child elements</a:t>
+            </a:r>
+          </a:p>
+          <a:p>
+            <a:pPr lvl="1"/>
+            <a:r>
+              <a:rPr lang="de-DE" sz="2000" smtClean="0">
+                <a:solidFill>
+                  <a:srgbClr val="006600"/>
+                </a:solidFill>
+                <a:latin typeface="Calibri Light" panose="020F0302020204030204" pitchFamily="34" charset="0"/>
+                <a:cs typeface="Calibri Light" panose="020F0302020204030204" pitchFamily="34" charset="0"/>
+              </a:rPr>
+              <a:t>The facet is the name of the </a:t>
+            </a:r>
+            <a:r>
+              <a:rPr lang="de-DE" sz="2000" u="sng" smtClean="0">
+                <a:solidFill>
+                  <a:srgbClr val="006600"/>
+                </a:solidFill>
+                <a:latin typeface="Calibri Light" panose="020F0302020204030204" pitchFamily="34" charset="0"/>
+                <a:cs typeface="Calibri Light" panose="020F0302020204030204" pitchFamily="34" charset="0"/>
+              </a:rPr>
+              <a:t>key parameter</a:t>
+            </a:r>
+            <a:r>
+              <a:rPr lang="de-DE" sz="2000" smtClean="0">
+                <a:solidFill>
+                  <a:srgbClr val="006600"/>
+                </a:solidFill>
+                <a:latin typeface="Calibri Light" panose="020F0302020204030204" pitchFamily="34" charset="0"/>
+                <a:cs typeface="Calibri Light" panose="020F0302020204030204" pitchFamily="34" charset="0"/>
+              </a:rPr>
+              <a:t> used</a:t>
+            </a:r>
+          </a:p>
+          <a:p>
+            <a:r>
+              <a:rPr lang="de-DE" sz="2400" smtClean="0">
+                <a:solidFill>
+                  <a:srgbClr val="006600"/>
+                </a:solidFill>
+                <a:latin typeface="Calibri Light" panose="020F0302020204030204" pitchFamily="34" charset="0"/>
+                <a:cs typeface="Calibri Light" panose="020F0302020204030204" pitchFamily="34" charset="0"/>
+              </a:rPr>
+              <a:t>Example: Constraint #1</a:t>
+            </a:r>
+          </a:p>
+          <a:p>
+            <a:pPr lvl="1"/>
+            <a:r>
+              <a:rPr lang="de-DE" sz="2000" smtClean="0">
+                <a:solidFill>
+                  <a:srgbClr val="006600"/>
+                </a:solidFill>
+                <a:latin typeface="Calibri Light" panose="020F0302020204030204" pitchFamily="34" charset="0"/>
+                <a:cs typeface="Calibri Light" panose="020F0302020204030204" pitchFamily="34" charset="0"/>
+              </a:rPr>
+              <a:t>Type:		     Value</a:t>
+            </a:r>
+          </a:p>
+          <a:p>
+            <a:pPr lvl="1"/>
+            <a:r>
+              <a:rPr lang="de-DE" sz="2000" smtClean="0">
+                <a:solidFill>
+                  <a:srgbClr val="006600"/>
+                </a:solidFill>
+                <a:latin typeface="Calibri Light" panose="020F0302020204030204" pitchFamily="34" charset="0"/>
+                <a:cs typeface="Calibri Light" panose="020F0302020204030204" pitchFamily="34" charset="0"/>
+              </a:rPr>
+              <a:t>Parameters: 	     exprXP, </a:t>
+            </a:r>
+            <a:r>
+              <a:rPr lang="de-DE" sz="2000" u="sng" smtClean="0">
+                <a:solidFill>
+                  <a:srgbClr val="006600"/>
+                </a:solidFill>
+                <a:latin typeface="Calibri Light" panose="020F0302020204030204" pitchFamily="34" charset="0"/>
+                <a:cs typeface="Calibri Light" panose="020F0302020204030204" pitchFamily="34" charset="0"/>
+              </a:rPr>
+              <a:t>minCount</a:t>
+            </a:r>
+            <a:r>
+              <a:rPr lang="de-DE" sz="2000" smtClean="0">
+                <a:solidFill>
+                  <a:srgbClr val="006600"/>
+                </a:solidFill>
+                <a:latin typeface="Calibri Light" panose="020F0302020204030204" pitchFamily="34" charset="0"/>
+                <a:cs typeface="Calibri Light" panose="020F0302020204030204" pitchFamily="34" charset="0"/>
+              </a:rPr>
+              <a:t>, minCountMsg</a:t>
+            </a:r>
+          </a:p>
+          <a:p>
+            <a:pPr lvl="1"/>
+            <a:r>
+              <a:rPr lang="de-DE" sz="2000" smtClean="0">
+                <a:solidFill>
+                  <a:srgbClr val="006600"/>
+                </a:solidFill>
+                <a:latin typeface="Calibri Light" panose="020F0302020204030204" pitchFamily="34" charset="0"/>
+                <a:cs typeface="Calibri Light" panose="020F0302020204030204" pitchFamily="34" charset="0"/>
+              </a:rPr>
+              <a:t>Facet: 		     MinCount</a:t>
+            </a:r>
+          </a:p>
+          <a:p>
+            <a:pPr lvl="1"/>
+            <a:r>
+              <a:rPr lang="de-DE" sz="2000" smtClean="0">
+                <a:solidFill>
+                  <a:srgbClr val="006600"/>
+                </a:solidFill>
+                <a:latin typeface="Calibri Light" panose="020F0302020204030204" pitchFamily="34" charset="0"/>
+                <a:cs typeface="Calibri Light" panose="020F0302020204030204" pitchFamily="34" charset="0"/>
+              </a:rPr>
+              <a:t>ConstraintComponent: ValueMinCount</a:t>
+            </a:r>
+          </a:p>
+        </p:txBody>
+      </p:sp>
+      <p:pic>
+        <p:nvPicPr>
+          <p:cNvPr id="11" name="Picture 10"/>
+          <p:cNvPicPr>
+            <a:picLocks noChangeAspect="1"/>
+          </p:cNvPicPr>
+          <p:nvPr/>
+        </p:nvPicPr>
+        <p:blipFill>
+          <a:blip r:embed="rId3"/>
+          <a:stretch>
+            <a:fillRect/>
+          </a:stretch>
+        </p:blipFill>
+        <p:spPr>
+          <a:xfrm>
+            <a:off x="806532" y="5373216"/>
+            <a:ext cx="7509884" cy="1170806"/>
+          </a:xfrm>
+          <a:prstGeom prst="rect">
+            <a:avLst/>
+          </a:prstGeom>
+        </p:spPr>
+      </p:pic>
+    </p:spTree>
+    <p:extLst>
+      <p:ext uri="{BB962C8B-B14F-4D97-AF65-F5344CB8AC3E}">
+        <p14:creationId xmlns:p14="http://schemas.microsoft.com/office/powerpoint/2010/main" val="400055890"/>
+      </p:ext>
+    </p:extLst>
+  </p:cSld>
+  <p:clrMapOvr>
+    <a:masterClrMapping/>
+  </p:clrMapOvr>
+</p:sld>
+</file>
+
+<file path=ppt/slides/slide12.xml><?xml version="1.0" encoding="utf-8"?>
+<p:sld xmlns:a="http://schemas.openxmlformats.org/drawingml/2006/main" xmlns:r="http://schemas.openxmlformats.org/officeDocument/2006/relationships" xmlns:p="http://schemas.openxmlformats.org/presentationml/2006/main">
+  <p:cSld>
+    <p:spTree>
+      <p:nvGrpSpPr>
+        <p:cNvPr id="1" name=""/>
+        <p:cNvGrpSpPr/>
+        <p:nvPr/>
+      </p:nvGrpSpPr>
+      <p:grpSpPr>
+        <a:xfrm>
+          <a:off x="0" y="0"/>
+          <a:ext cx="0" cy="0"/>
+          <a:chOff x="0" y="0"/>
+          <a:chExt cx="0" cy="0"/>
+        </a:xfrm>
+      </p:grpSpPr>
+      <p:sp>
+        <p:nvSpPr>
+          <p:cNvPr id="2" name="Title 1"/>
+          <p:cNvSpPr>
+            <a:spLocks noGrp="1"/>
+          </p:cNvSpPr>
+          <p:nvPr>
+            <p:ph type="title"/>
+          </p:nvPr>
+        </p:nvSpPr>
+        <p:spPr/>
+        <p:txBody>
+          <a:bodyPr/>
+          <a:lstStyle/>
+          <a:p>
+            <a:r>
+              <a:rPr lang="de-DE" smtClean="0">
+                <a:solidFill>
+                  <a:srgbClr val="006600"/>
+                </a:solidFill>
+                <a:latin typeface="Calibri Light" panose="020F0302020204030204" pitchFamily="34" charset="0"/>
+                <a:cs typeface="Calibri Light" panose="020F0302020204030204" pitchFamily="34" charset="0"/>
+              </a:rPr>
+              <a:t>Constraints III</a:t>
+            </a:r>
+            <a:endParaRPr lang="de-DE">
+              <a:solidFill>
+                <a:srgbClr val="006600"/>
+              </a:solidFill>
+              <a:latin typeface="Calibri Light" panose="020F0302020204030204" pitchFamily="34" charset="0"/>
+              <a:cs typeface="Calibri Light" panose="020F0302020204030204" pitchFamily="34" charset="0"/>
+            </a:endParaRPr>
+          </a:p>
+        </p:txBody>
+      </p:sp>
+      <p:sp>
+        <p:nvSpPr>
+          <p:cNvPr id="3" name="Content Placeholder 2"/>
+          <p:cNvSpPr>
+            <a:spLocks noGrp="1"/>
+          </p:cNvSpPr>
+          <p:nvPr>
+            <p:ph idx="1"/>
+          </p:nvPr>
+        </p:nvSpPr>
+        <p:spPr/>
+        <p:txBody>
+          <a:bodyPr/>
+          <a:lstStyle/>
+          <a:p>
+            <a:r>
+              <a:rPr lang="de-DE" sz="2400" smtClean="0">
+                <a:solidFill>
+                  <a:srgbClr val="006600"/>
+                </a:solidFill>
+                <a:latin typeface="Calibri Light" panose="020F0302020204030204" pitchFamily="34" charset="0"/>
+                <a:cs typeface="Calibri Light" panose="020F0302020204030204" pitchFamily="34" charset="0"/>
+              </a:rPr>
+              <a:t>A constraint has a type, a a set of parameters, a facet</a:t>
+            </a:r>
+          </a:p>
+          <a:p>
+            <a:pPr lvl="1"/>
+            <a:r>
+              <a:rPr lang="de-DE" sz="2000" smtClean="0">
+                <a:solidFill>
+                  <a:srgbClr val="006600"/>
+                </a:solidFill>
+                <a:latin typeface="Calibri Light" panose="020F0302020204030204" pitchFamily="34" charset="0"/>
+                <a:cs typeface="Calibri Light" panose="020F0302020204030204" pitchFamily="34" charset="0"/>
+              </a:rPr>
+              <a:t>The type is identified by the XML element name</a:t>
+            </a:r>
+          </a:p>
+          <a:p>
+            <a:pPr lvl="1"/>
+            <a:r>
+              <a:rPr lang="de-DE" sz="2000" smtClean="0">
+                <a:solidFill>
+                  <a:srgbClr val="006600"/>
+                </a:solidFill>
+                <a:latin typeface="Calibri Light" panose="020F0302020204030204" pitchFamily="34" charset="0"/>
+                <a:cs typeface="Calibri Light" panose="020F0302020204030204" pitchFamily="34" charset="0"/>
+              </a:rPr>
+              <a:t>The parameters are provided by attributes / child elements</a:t>
+            </a:r>
+          </a:p>
+          <a:p>
+            <a:pPr lvl="1"/>
+            <a:r>
+              <a:rPr lang="de-DE" sz="2000">
+                <a:solidFill>
+                  <a:srgbClr val="006600"/>
+                </a:solidFill>
+                <a:latin typeface="Calibri Light" panose="020F0302020204030204" pitchFamily="34" charset="0"/>
+                <a:cs typeface="Calibri Light" panose="020F0302020204030204" pitchFamily="34" charset="0"/>
+              </a:rPr>
+              <a:t>The facet is the name of the </a:t>
+            </a:r>
+            <a:r>
+              <a:rPr lang="de-DE" sz="2000" u="sng">
+                <a:solidFill>
+                  <a:srgbClr val="006600"/>
+                </a:solidFill>
+                <a:latin typeface="Calibri Light" panose="020F0302020204030204" pitchFamily="34" charset="0"/>
+                <a:cs typeface="Calibri Light" panose="020F0302020204030204" pitchFamily="34" charset="0"/>
+              </a:rPr>
+              <a:t>key parameter</a:t>
+            </a:r>
+            <a:r>
+              <a:rPr lang="de-DE" sz="2000">
+                <a:solidFill>
+                  <a:srgbClr val="006600"/>
+                </a:solidFill>
+                <a:latin typeface="Calibri Light" panose="020F0302020204030204" pitchFamily="34" charset="0"/>
+                <a:cs typeface="Calibri Light" panose="020F0302020204030204" pitchFamily="34" charset="0"/>
+              </a:rPr>
+              <a:t> used</a:t>
+            </a:r>
+            <a:endParaRPr lang="de-DE" sz="2000" u="sng" smtClean="0">
+              <a:solidFill>
+                <a:srgbClr val="006600"/>
+              </a:solidFill>
+              <a:latin typeface="Calibri Light" panose="020F0302020204030204" pitchFamily="34" charset="0"/>
+              <a:cs typeface="Calibri Light" panose="020F0302020204030204" pitchFamily="34" charset="0"/>
+            </a:endParaRPr>
+          </a:p>
+          <a:p>
+            <a:r>
+              <a:rPr lang="de-DE" sz="2400" smtClean="0">
+                <a:solidFill>
+                  <a:srgbClr val="006600"/>
+                </a:solidFill>
+                <a:latin typeface="Calibri Light" panose="020F0302020204030204" pitchFamily="34" charset="0"/>
+                <a:cs typeface="Calibri Light" panose="020F0302020204030204" pitchFamily="34" charset="0"/>
+              </a:rPr>
+              <a:t>Example: Constraint #2</a:t>
+            </a:r>
+          </a:p>
+          <a:p>
+            <a:pPr lvl="1"/>
+            <a:r>
+              <a:rPr lang="de-DE" sz="2000" smtClean="0">
+                <a:solidFill>
+                  <a:srgbClr val="006600"/>
+                </a:solidFill>
+                <a:latin typeface="Calibri Light" panose="020F0302020204030204" pitchFamily="34" charset="0"/>
+                <a:cs typeface="Calibri Light" panose="020F0302020204030204" pitchFamily="34" charset="0"/>
+              </a:rPr>
+              <a:t>Type:		     Value</a:t>
+            </a:r>
+          </a:p>
+          <a:p>
+            <a:pPr lvl="1"/>
+            <a:r>
+              <a:rPr lang="de-DE" sz="2000" smtClean="0">
+                <a:solidFill>
+                  <a:srgbClr val="006600"/>
+                </a:solidFill>
+                <a:latin typeface="Calibri Light" panose="020F0302020204030204" pitchFamily="34" charset="0"/>
+                <a:cs typeface="Calibri Light" panose="020F0302020204030204" pitchFamily="34" charset="0"/>
+              </a:rPr>
+              <a:t>Parameters: 	     exprXP, </a:t>
+            </a:r>
+            <a:r>
+              <a:rPr lang="de-DE" sz="2000" u="sng" smtClean="0">
+                <a:solidFill>
+                  <a:srgbClr val="006600"/>
+                </a:solidFill>
+                <a:latin typeface="Calibri Light" panose="020F0302020204030204" pitchFamily="34" charset="0"/>
+                <a:cs typeface="Calibri Light" panose="020F0302020204030204" pitchFamily="34" charset="0"/>
+              </a:rPr>
+              <a:t>distinct</a:t>
+            </a:r>
+            <a:endParaRPr lang="de-DE" sz="2000" smtClean="0">
+              <a:solidFill>
+                <a:srgbClr val="006600"/>
+              </a:solidFill>
+              <a:latin typeface="Calibri Light" panose="020F0302020204030204" pitchFamily="34" charset="0"/>
+              <a:cs typeface="Calibri Light" panose="020F0302020204030204" pitchFamily="34" charset="0"/>
+            </a:endParaRPr>
+          </a:p>
+          <a:p>
+            <a:pPr lvl="1"/>
+            <a:r>
+              <a:rPr lang="de-DE" sz="2000" smtClean="0">
+                <a:solidFill>
+                  <a:srgbClr val="006600"/>
+                </a:solidFill>
+                <a:latin typeface="Calibri Light" panose="020F0302020204030204" pitchFamily="34" charset="0"/>
+                <a:cs typeface="Calibri Light" panose="020F0302020204030204" pitchFamily="34" charset="0"/>
+              </a:rPr>
+              <a:t>Facet: 		     Distinct</a:t>
+            </a:r>
+          </a:p>
+          <a:p>
+            <a:pPr lvl="1"/>
+            <a:r>
+              <a:rPr lang="de-DE" sz="2000" smtClean="0">
+                <a:solidFill>
+                  <a:srgbClr val="006600"/>
+                </a:solidFill>
+                <a:latin typeface="Calibri Light" panose="020F0302020204030204" pitchFamily="34" charset="0"/>
+                <a:cs typeface="Calibri Light" panose="020F0302020204030204" pitchFamily="34" charset="0"/>
+              </a:rPr>
+              <a:t>ConstraintComponent: ValueDistinct</a:t>
+            </a:r>
+          </a:p>
+        </p:txBody>
+      </p:sp>
+      <p:sp>
+        <p:nvSpPr>
+          <p:cNvPr id="4" name="Date Placeholder 3"/>
+          <p:cNvSpPr>
+            <a:spLocks noGrp="1"/>
+          </p:cNvSpPr>
+          <p:nvPr>
+            <p:ph type="dt" sz="half" idx="10"/>
+          </p:nvPr>
+        </p:nvSpPr>
+        <p:spPr/>
+        <p:txBody>
+          <a:bodyPr/>
+          <a:lstStyle/>
+          <a:p>
+            <a:pPr>
+              <a:defRPr/>
+            </a:pPr>
+            <a:r>
+              <a:rPr lang="de-DE" altLang="de-DE" smtClean="0"/>
+              <a:t>2020-10-08</a:t>
+            </a:r>
+            <a:endParaRPr lang="de-DE" altLang="en-US"/>
+          </a:p>
+        </p:txBody>
+      </p:sp>
+      <p:sp>
+        <p:nvSpPr>
+          <p:cNvPr id="5" name="Footer Placeholder 4"/>
+          <p:cNvSpPr>
+            <a:spLocks noGrp="1"/>
+          </p:cNvSpPr>
+          <p:nvPr>
+            <p:ph type="ftr" sz="quarter" idx="11"/>
+          </p:nvPr>
+        </p:nvSpPr>
+        <p:spPr/>
+        <p:txBody>
+          <a:bodyPr/>
+          <a:lstStyle/>
+          <a:p>
+            <a:pPr>
+              <a:defRPr/>
+            </a:pPr>
+            <a:r>
+              <a:rPr lang="de-DE" altLang="en-US" smtClean="0"/>
+              <a:t>Greenfox</a:t>
+            </a:r>
+            <a:endParaRPr lang="de-DE" altLang="en-US"/>
+          </a:p>
+        </p:txBody>
+      </p:sp>
+      <p:sp>
+        <p:nvSpPr>
+          <p:cNvPr id="6" name="Slide Number Placeholder 5"/>
+          <p:cNvSpPr>
+            <a:spLocks noGrp="1"/>
+          </p:cNvSpPr>
+          <p:nvPr>
+            <p:ph type="sldNum" sz="quarter" idx="12"/>
+          </p:nvPr>
+        </p:nvSpPr>
+        <p:spPr/>
+        <p:txBody>
+          <a:bodyPr/>
+          <a:lstStyle/>
+          <a:p>
+            <a:pPr>
+              <a:defRPr/>
+            </a:pPr>
+            <a:fld id="{F031B2F4-27D1-4E53-97CF-1947CD75B185}" type="slidenum">
+              <a:rPr lang="de-DE" altLang="en-US" smtClean="0"/>
+              <a:pPr>
+                <a:defRPr/>
+              </a:pPr>
+              <a:t>12</a:t>
+            </a:fld>
+            <a:endParaRPr lang="de-DE" altLang="en-US"/>
+          </a:p>
+        </p:txBody>
+      </p:sp>
+      <p:pic>
+        <p:nvPicPr>
+          <p:cNvPr id="10" name="Picture 9"/>
+          <p:cNvPicPr>
+            <a:picLocks noChangeAspect="1"/>
+          </p:cNvPicPr>
+          <p:nvPr/>
+        </p:nvPicPr>
+        <p:blipFill>
+          <a:blip r:embed="rId2"/>
+          <a:stretch>
+            <a:fillRect/>
+          </a:stretch>
+        </p:blipFill>
+        <p:spPr>
+          <a:xfrm>
+            <a:off x="1382596" y="5373216"/>
+            <a:ext cx="7509884" cy="1170806"/>
+          </a:xfrm>
+          <a:prstGeom prst="rect">
+            <a:avLst/>
+          </a:prstGeom>
+        </p:spPr>
+      </p:pic>
+    </p:spTree>
+    <p:extLst>
+      <p:ext uri="{BB962C8B-B14F-4D97-AF65-F5344CB8AC3E}">
+        <p14:creationId xmlns:p14="http://schemas.microsoft.com/office/powerpoint/2010/main" val="2700646792"/>
+      </p:ext>
+    </p:extLst>
+  </p:cSld>
+  <p:clrMapOvr>
+    <a:masterClrMapping/>
+  </p:clrMapOvr>
+</p:sld>
+</file>
+
+<file path=ppt/slides/slide13.xml><?xml version="1.0" encoding="utf-8"?>
+<p:sld xmlns:a="http://schemas.openxmlformats.org/drawingml/2006/main" xmlns:r="http://schemas.openxmlformats.org/officeDocument/2006/relationships" xmlns:p="http://schemas.openxmlformats.org/presentationml/2006/main">
+  <p:cSld>
+    <p:spTree>
+      <p:nvGrpSpPr>
+        <p:cNvPr id="1" name=""/>
+        <p:cNvGrpSpPr/>
+        <p:nvPr/>
+      </p:nvGrpSpPr>
+      <p:grpSpPr>
+        <a:xfrm>
+          <a:off x="0" y="0"/>
+          <a:ext cx="0" cy="0"/>
+          <a:chOff x="0" y="0"/>
+          <a:chExt cx="0" cy="0"/>
+        </a:xfrm>
+      </p:grpSpPr>
+      <p:sp>
+        <p:nvSpPr>
+          <p:cNvPr id="2" name="Title 1"/>
+          <p:cNvSpPr>
+            <a:spLocks noGrp="1"/>
+          </p:cNvSpPr>
+          <p:nvPr>
+            <p:ph type="title"/>
+          </p:nvPr>
+        </p:nvSpPr>
+        <p:spPr/>
+        <p:txBody>
+          <a:bodyPr/>
+          <a:lstStyle/>
+          <a:p>
+            <a:r>
+              <a:rPr lang="de-DE" smtClean="0">
+                <a:solidFill>
+                  <a:srgbClr val="006600"/>
+                </a:solidFill>
+                <a:latin typeface="Calibri Light" panose="020F0302020204030204" pitchFamily="34" charset="0"/>
+                <a:cs typeface="Calibri Light" panose="020F0302020204030204" pitchFamily="34" charset="0"/>
+              </a:rPr>
+              <a:t>Shapes</a:t>
+            </a:r>
+            <a:endParaRPr lang="de-DE">
+              <a:solidFill>
+                <a:srgbClr val="006600"/>
+              </a:solidFill>
+              <a:latin typeface="Calibri Light" panose="020F0302020204030204" pitchFamily="34" charset="0"/>
+              <a:cs typeface="Calibri Light" panose="020F0302020204030204" pitchFamily="34" charset="0"/>
+            </a:endParaRPr>
+          </a:p>
+        </p:txBody>
+      </p:sp>
+      <p:sp>
+        <p:nvSpPr>
+          <p:cNvPr id="3" name="Content Placeholder 2"/>
+          <p:cNvSpPr>
+            <a:spLocks noGrp="1"/>
+          </p:cNvSpPr>
+          <p:nvPr>
+            <p:ph idx="1"/>
+          </p:nvPr>
+        </p:nvSpPr>
+        <p:spPr/>
+        <p:txBody>
+          <a:bodyPr/>
+          <a:lstStyle/>
+          <a:p>
+            <a:r>
+              <a:rPr lang="de-DE" sz="2400" smtClean="0">
+                <a:solidFill>
+                  <a:srgbClr val="006600"/>
+                </a:solidFill>
+                <a:latin typeface="Calibri Light" panose="020F0302020204030204" pitchFamily="34" charset="0"/>
+                <a:cs typeface="Calibri Light" panose="020F0302020204030204" pitchFamily="34" charset="0"/>
+              </a:rPr>
+              <a:t>Shape is two things:</a:t>
+            </a:r>
+          </a:p>
+          <a:p>
+            <a:pPr lvl="1"/>
+            <a:r>
+              <a:rPr lang="de-DE" sz="2000" smtClean="0">
+                <a:solidFill>
+                  <a:srgbClr val="006600"/>
+                </a:solidFill>
+                <a:latin typeface="Calibri Light" panose="020F0302020204030204" pitchFamily="34" charset="0"/>
+                <a:cs typeface="Calibri Light" panose="020F0302020204030204" pitchFamily="34" charset="0"/>
+              </a:rPr>
+              <a:t>Set of </a:t>
+            </a:r>
+            <a:r>
+              <a:rPr lang="de-DE" sz="2000" u="sng" smtClean="0">
+                <a:solidFill>
+                  <a:srgbClr val="006600"/>
+                </a:solidFill>
+                <a:latin typeface="Calibri Light" panose="020F0302020204030204" pitchFamily="34" charset="0"/>
+                <a:cs typeface="Calibri Light" panose="020F0302020204030204" pitchFamily="34" charset="0"/>
+              </a:rPr>
+              <a:t>constraint</a:t>
+            </a:r>
+            <a:r>
+              <a:rPr lang="de-DE" sz="2000" smtClean="0">
+                <a:solidFill>
+                  <a:srgbClr val="006600"/>
+                </a:solidFill>
+                <a:latin typeface="Calibri Light" panose="020F0302020204030204" pitchFamily="34" charset="0"/>
+                <a:cs typeface="Calibri Light" panose="020F0302020204030204" pitchFamily="34" charset="0"/>
+              </a:rPr>
+              <a:t>s</a:t>
+            </a:r>
+          </a:p>
+          <a:p>
+            <a:pPr lvl="1"/>
+            <a:r>
+              <a:rPr lang="de-DE" sz="2000" u="sng" smtClean="0">
+                <a:solidFill>
+                  <a:srgbClr val="006600"/>
+                </a:solidFill>
+                <a:latin typeface="Calibri Light" panose="020F0302020204030204" pitchFamily="34" charset="0"/>
+                <a:cs typeface="Calibri Light" panose="020F0302020204030204" pitchFamily="34" charset="0"/>
+              </a:rPr>
+              <a:t>Target declaration</a:t>
+            </a:r>
+          </a:p>
+          <a:p>
+            <a:r>
+              <a:rPr lang="de-DE" sz="2400" smtClean="0">
+                <a:solidFill>
+                  <a:srgbClr val="006600"/>
+                </a:solidFill>
+                <a:latin typeface="Calibri Light" panose="020F0302020204030204" pitchFamily="34" charset="0"/>
+                <a:cs typeface="Calibri Light" panose="020F0302020204030204" pitchFamily="34" charset="0"/>
+              </a:rPr>
+              <a:t>Target declaration:</a:t>
+            </a:r>
+          </a:p>
+          <a:p>
+            <a:pPr marL="0" indent="0">
+              <a:buNone/>
+            </a:pPr>
+            <a:r>
+              <a:rPr lang="de-DE" sz="2400" i="1">
+                <a:solidFill>
+                  <a:srgbClr val="006600"/>
+                </a:solidFill>
+                <a:latin typeface="Calibri Light" panose="020F0302020204030204" pitchFamily="34" charset="0"/>
+                <a:cs typeface="Calibri Light" panose="020F0302020204030204" pitchFamily="34" charset="0"/>
+              </a:rPr>
+              <a:t> </a:t>
+            </a:r>
+            <a:r>
+              <a:rPr lang="de-DE" sz="2400" i="1" smtClean="0">
+                <a:solidFill>
+                  <a:srgbClr val="006600"/>
+                </a:solidFill>
+                <a:latin typeface="Calibri Light" panose="020F0302020204030204" pitchFamily="34" charset="0"/>
+                <a:cs typeface="Calibri Light" panose="020F0302020204030204" pitchFamily="34" charset="0"/>
+              </a:rPr>
+              <a:t>        „The constraints apply to these resources: (a selector)“ </a:t>
+            </a:r>
+          </a:p>
+          <a:p>
+            <a:r>
+              <a:rPr lang="de-DE" sz="2400" smtClean="0">
+                <a:solidFill>
+                  <a:srgbClr val="006600"/>
+                </a:solidFill>
+                <a:latin typeface="Calibri Light" panose="020F0302020204030204" pitchFamily="34" charset="0"/>
+                <a:cs typeface="Calibri Light" panose="020F0302020204030204" pitchFamily="34" charset="0"/>
+              </a:rPr>
+              <a:t>Schema representation of a shape: </a:t>
+            </a:r>
+            <a:r>
+              <a:rPr lang="de-DE" sz="2400" smtClean="0">
+                <a:solidFill>
+                  <a:srgbClr val="006600"/>
+                </a:solidFill>
+                <a:latin typeface="Courier New" panose="02070309020205020404" pitchFamily="49" charset="0"/>
+                <a:cs typeface="Courier New" panose="02070309020205020404" pitchFamily="49" charset="0"/>
+              </a:rPr>
+              <a:t>&lt;file&gt;</a:t>
+            </a:r>
+            <a:r>
+              <a:rPr lang="de-DE" sz="2400" smtClean="0">
+                <a:solidFill>
+                  <a:srgbClr val="006600"/>
+                </a:solidFill>
+                <a:latin typeface="Calibri Light" panose="020F0302020204030204" pitchFamily="34" charset="0"/>
+                <a:cs typeface="Calibri Light" panose="020F0302020204030204" pitchFamily="34" charset="0"/>
+              </a:rPr>
+              <a:t> or </a:t>
+            </a:r>
+            <a:r>
+              <a:rPr lang="de-DE" sz="2400" smtClean="0">
+                <a:solidFill>
+                  <a:srgbClr val="006600"/>
+                </a:solidFill>
+                <a:latin typeface="Courier New" panose="02070309020205020404" pitchFamily="49" charset="0"/>
+                <a:cs typeface="Courier New" panose="02070309020205020404" pitchFamily="49" charset="0"/>
+              </a:rPr>
+              <a:t>&lt;folder&gt;</a:t>
+            </a:r>
+          </a:p>
+          <a:p>
+            <a:pPr lvl="1"/>
+            <a:r>
+              <a:rPr lang="de-DE" sz="2000" smtClean="0">
+                <a:solidFill>
+                  <a:srgbClr val="006600"/>
+                </a:solidFill>
+                <a:latin typeface="Calibri Light" panose="020F0302020204030204" pitchFamily="34" charset="0"/>
+                <a:cs typeface="Calibri Light" panose="020F0302020204030204" pitchFamily="34" charset="0"/>
+              </a:rPr>
+              <a:t>Element name: 	the kind of resources</a:t>
+            </a:r>
+          </a:p>
+          <a:p>
+            <a:pPr lvl="1"/>
+            <a:r>
+              <a:rPr lang="de-DE" sz="2000" smtClean="0">
+                <a:solidFill>
+                  <a:srgbClr val="006600"/>
+                </a:solidFill>
+                <a:latin typeface="Calibri Light" panose="020F0302020204030204" pitchFamily="34" charset="0"/>
+                <a:cs typeface="Calibri Light" panose="020F0302020204030204" pitchFamily="34" charset="0"/>
+              </a:rPr>
+              <a:t>Attributes: 	target declaration</a:t>
+            </a:r>
+          </a:p>
+          <a:p>
+            <a:pPr lvl="1"/>
+            <a:r>
+              <a:rPr lang="de-DE" sz="2000" smtClean="0">
+                <a:solidFill>
+                  <a:srgbClr val="006600"/>
+                </a:solidFill>
+                <a:latin typeface="Calibri Light" panose="020F0302020204030204" pitchFamily="34" charset="0"/>
+                <a:cs typeface="Calibri Light" panose="020F0302020204030204" pitchFamily="34" charset="0"/>
+              </a:rPr>
+              <a:t>Child elements: 	constraints</a:t>
+            </a:r>
+          </a:p>
+          <a:p>
+            <a:endParaRPr lang="de-DE" sz="2400">
+              <a:solidFill>
+                <a:srgbClr val="006600"/>
+              </a:solidFill>
+              <a:latin typeface="Calibri Light" panose="020F0302020204030204" pitchFamily="34" charset="0"/>
+              <a:cs typeface="Calibri Light" panose="020F0302020204030204" pitchFamily="34" charset="0"/>
+            </a:endParaRPr>
+          </a:p>
+          <a:p>
+            <a:endParaRPr lang="de-DE" sz="2400" smtClean="0">
+              <a:solidFill>
+                <a:srgbClr val="006600"/>
+              </a:solidFill>
+              <a:latin typeface="Calibri Light" panose="020F0302020204030204" pitchFamily="34" charset="0"/>
+              <a:cs typeface="Calibri Light" panose="020F0302020204030204" pitchFamily="34" charset="0"/>
+            </a:endParaRPr>
+          </a:p>
+          <a:p>
+            <a:endParaRPr lang="de-DE" sz="2400" smtClean="0">
+              <a:solidFill>
+                <a:srgbClr val="006600"/>
+              </a:solidFill>
+              <a:latin typeface="Calibri Light" panose="020F0302020204030204" pitchFamily="34" charset="0"/>
+              <a:cs typeface="Calibri Light" panose="020F0302020204030204" pitchFamily="34" charset="0"/>
+            </a:endParaRPr>
+          </a:p>
+          <a:p>
+            <a:pPr marL="0" indent="0">
+              <a:buNone/>
+            </a:pPr>
+            <a:endParaRPr lang="de-DE">
+              <a:solidFill>
+                <a:srgbClr val="006600"/>
+              </a:solidFill>
+              <a:latin typeface="Calibri Light" panose="020F0302020204030204" pitchFamily="34" charset="0"/>
+              <a:cs typeface="Calibri Light" panose="020F0302020204030204" pitchFamily="34" charset="0"/>
+            </a:endParaRPr>
+          </a:p>
+        </p:txBody>
+      </p:sp>
+      <p:pic>
+        <p:nvPicPr>
+          <p:cNvPr id="9" name="Picture 8"/>
+          <p:cNvPicPr>
+            <a:picLocks noChangeAspect="1"/>
+          </p:cNvPicPr>
+          <p:nvPr/>
+        </p:nvPicPr>
+        <p:blipFill>
+          <a:blip r:embed="rId3"/>
+          <a:stretch>
+            <a:fillRect/>
+          </a:stretch>
+        </p:blipFill>
+        <p:spPr>
+          <a:xfrm>
+            <a:off x="655265" y="5373216"/>
+            <a:ext cx="7877175" cy="1200150"/>
+          </a:xfrm>
+          <a:prstGeom prst="rect">
+            <a:avLst/>
+          </a:prstGeom>
+        </p:spPr>
+      </p:pic>
+    </p:spTree>
+    <p:extLst>
+      <p:ext uri="{BB962C8B-B14F-4D97-AF65-F5344CB8AC3E}">
+        <p14:creationId xmlns:p14="http://schemas.microsoft.com/office/powerpoint/2010/main" val="2636535453"/>
+      </p:ext>
+    </p:extLst>
+  </p:cSld>
+  <p:clrMapOvr>
+    <a:masterClrMapping/>
+  </p:clrMapOvr>
+</p:sld>
+</file>
+
+<file path=ppt/slides/slide14.xml><?xml version="1.0" encoding="utf-8"?>
+<p:sld xmlns:a="http://schemas.openxmlformats.org/drawingml/2006/main" xmlns:r="http://schemas.openxmlformats.org/officeDocument/2006/relationships" xmlns:p="http://schemas.openxmlformats.org/presentationml/2006/main">
+  <p:cSld>
+    <p:spTree>
+      <p:nvGrpSpPr>
+        <p:cNvPr id="1" name=""/>
+        <p:cNvGrpSpPr/>
+        <p:nvPr/>
+      </p:nvGrpSpPr>
+      <p:grpSpPr>
+        <a:xfrm>
+          <a:off x="0" y="0"/>
+          <a:ext cx="0" cy="0"/>
+          <a:chOff x="0" y="0"/>
+          <a:chExt cx="0" cy="0"/>
+        </a:xfrm>
+      </p:grpSpPr>
+      <p:sp>
+        <p:nvSpPr>
+          <p:cNvPr id="2" name="Title 1"/>
+          <p:cNvSpPr>
+            <a:spLocks noGrp="1"/>
+          </p:cNvSpPr>
+          <p:nvPr>
+            <p:ph type="title"/>
+          </p:nvPr>
+        </p:nvSpPr>
+        <p:spPr>
+          <a:xfrm>
+            <a:off x="457200" y="116632"/>
+            <a:ext cx="7543800" cy="1295400"/>
+          </a:xfrm>
+        </p:spPr>
+        <p:txBody>
+          <a:bodyPr/>
+          <a:lstStyle/>
+          <a:p>
+            <a:r>
+              <a:rPr lang="de-DE" smtClean="0">
+                <a:solidFill>
+                  <a:srgbClr val="006600"/>
+                </a:solidFill>
+                <a:latin typeface="Calibri Light" panose="020F0302020204030204" pitchFamily="34" charset="0"/>
+                <a:cs typeface="Calibri Light" panose="020F0302020204030204" pitchFamily="34" charset="0"/>
+              </a:rPr>
+              <a:t>Target declaration</a:t>
+            </a:r>
+            <a:endParaRPr lang="de-DE">
+              <a:solidFill>
+                <a:srgbClr val="006600"/>
+              </a:solidFill>
+              <a:latin typeface="Calibri Light" panose="020F0302020204030204" pitchFamily="34" charset="0"/>
+              <a:cs typeface="Calibri Light" panose="020F0302020204030204" pitchFamily="34" charset="0"/>
+            </a:endParaRPr>
+          </a:p>
+        </p:txBody>
+      </p:sp>
+      <p:sp>
+        <p:nvSpPr>
+          <p:cNvPr id="3" name="Content Placeholder 2"/>
+          <p:cNvSpPr>
+            <a:spLocks noGrp="1"/>
+          </p:cNvSpPr>
+          <p:nvPr>
+            <p:ph idx="1"/>
+          </p:nvPr>
+        </p:nvSpPr>
+        <p:spPr/>
+        <p:txBody>
+          <a:bodyPr/>
+          <a:lstStyle/>
+          <a:p>
+            <a:r>
+              <a:rPr lang="de-DE" sz="2400" smtClean="0">
+                <a:solidFill>
+                  <a:srgbClr val="006600"/>
+                </a:solidFill>
+                <a:latin typeface="Calibri Light" panose="020F0302020204030204" pitchFamily="34" charset="0"/>
+                <a:cs typeface="Calibri Light" panose="020F0302020204030204" pitchFamily="34" charset="0"/>
+              </a:rPr>
+              <a:t>A target declaration is a function:</a:t>
+            </a:r>
+          </a:p>
+          <a:p>
+            <a:endParaRPr lang="de-DE" sz="2400">
+              <a:solidFill>
+                <a:srgbClr val="006600"/>
+              </a:solidFill>
+              <a:latin typeface="Calibri Light" panose="020F0302020204030204" pitchFamily="34" charset="0"/>
+              <a:cs typeface="Calibri Light" panose="020F0302020204030204" pitchFamily="34" charset="0"/>
+            </a:endParaRPr>
+          </a:p>
+          <a:p>
+            <a:endParaRPr lang="de-DE" sz="2400" smtClean="0">
+              <a:solidFill>
+                <a:srgbClr val="006600"/>
+              </a:solidFill>
+              <a:latin typeface="Calibri Light" panose="020F0302020204030204" pitchFamily="34" charset="0"/>
+              <a:cs typeface="Calibri Light" panose="020F0302020204030204" pitchFamily="34" charset="0"/>
+            </a:endParaRPr>
+          </a:p>
+          <a:p>
+            <a:endParaRPr lang="de-DE" sz="2400">
+              <a:solidFill>
+                <a:srgbClr val="006600"/>
+              </a:solidFill>
+              <a:latin typeface="Calibri Light" panose="020F0302020204030204" pitchFamily="34" charset="0"/>
+              <a:cs typeface="Calibri Light" panose="020F0302020204030204" pitchFamily="34" charset="0"/>
+            </a:endParaRPr>
+          </a:p>
+          <a:p>
+            <a:endParaRPr lang="de-DE" sz="2400" smtClean="0">
+              <a:solidFill>
+                <a:srgbClr val="006600"/>
+              </a:solidFill>
+              <a:latin typeface="Calibri Light" panose="020F0302020204030204" pitchFamily="34" charset="0"/>
+              <a:cs typeface="Calibri Light" panose="020F0302020204030204" pitchFamily="34" charset="0"/>
+            </a:endParaRPr>
+          </a:p>
+          <a:p>
+            <a:endParaRPr lang="de-DE" sz="2400">
+              <a:solidFill>
+                <a:srgbClr val="006600"/>
+              </a:solidFill>
+              <a:latin typeface="Calibri Light" panose="020F0302020204030204" pitchFamily="34" charset="0"/>
+              <a:cs typeface="Calibri Light" panose="020F0302020204030204" pitchFamily="34" charset="0"/>
+            </a:endParaRPr>
+          </a:p>
+          <a:p>
+            <a:endParaRPr lang="de-DE" sz="2400" smtClean="0">
+              <a:solidFill>
+                <a:srgbClr val="006600"/>
+              </a:solidFill>
+              <a:latin typeface="Calibri Light" panose="020F0302020204030204" pitchFamily="34" charset="0"/>
+              <a:cs typeface="Calibri Light" panose="020F0302020204030204" pitchFamily="34" charset="0"/>
+            </a:endParaRPr>
+          </a:p>
+          <a:p>
+            <a:r>
+              <a:rPr lang="de-DE" sz="2400" smtClean="0">
+                <a:solidFill>
+                  <a:srgbClr val="006600"/>
+                </a:solidFill>
+                <a:latin typeface="Calibri Light" panose="020F0302020204030204" pitchFamily="34" charset="0"/>
+                <a:cs typeface="Calibri Light" panose="020F0302020204030204" pitchFamily="34" charset="0"/>
+              </a:rPr>
+              <a:t>Schema representation: attributes of the shape element</a:t>
+            </a:r>
+          </a:p>
+        </p:txBody>
+      </p:sp>
+      <p:sp>
+        <p:nvSpPr>
+          <p:cNvPr id="5" name="TextBox 4"/>
+          <p:cNvSpPr txBox="1"/>
+          <p:nvPr/>
+        </p:nvSpPr>
+        <p:spPr>
+          <a:xfrm>
+            <a:off x="323528" y="2276872"/>
+            <a:ext cx="8820472" cy="2308324"/>
+          </a:xfrm>
+          <a:prstGeom prst="rect">
+            <a:avLst/>
+          </a:prstGeom>
+          <a:noFill/>
+        </p:spPr>
+        <p:txBody>
+          <a:bodyPr wrap="square" rtlCol="0">
+            <a:spAutoFit/>
+          </a:bodyPr>
+          <a:lstStyle/>
+          <a:p>
+            <a:pPr marL="0" indent="0">
+              <a:buNone/>
+            </a:pPr>
+            <a:r>
+              <a:rPr lang="de-DE" sz="2400" b="0">
+                <a:solidFill>
+                  <a:srgbClr val="006600"/>
+                </a:solidFill>
+                <a:latin typeface="Calibri Light" panose="020F0302020204030204" pitchFamily="34" charset="0"/>
+                <a:cs typeface="Calibri Light" panose="020F0302020204030204" pitchFamily="34" charset="0"/>
+              </a:rPr>
+              <a:t>	Maps a </a:t>
+            </a:r>
+            <a:r>
+              <a:rPr lang="de-DE" sz="2400" b="0" u="sng">
+                <a:solidFill>
+                  <a:srgbClr val="006600"/>
+                </a:solidFill>
+                <a:latin typeface="Calibri Light" panose="020F0302020204030204" pitchFamily="34" charset="0"/>
+                <a:cs typeface="Calibri Light" panose="020F0302020204030204" pitchFamily="34" charset="0"/>
+              </a:rPr>
+              <a:t>resource</a:t>
+            </a:r>
+            <a:r>
+              <a:rPr lang="de-DE" sz="2400" b="0">
+                <a:solidFill>
+                  <a:srgbClr val="006600"/>
+                </a:solidFill>
+                <a:latin typeface="Calibri Light" panose="020F0302020204030204" pitchFamily="34" charset="0"/>
+                <a:cs typeface="Calibri Light" panose="020F0302020204030204" pitchFamily="34" charset="0"/>
+              </a:rPr>
+              <a:t> to </a:t>
+            </a:r>
+            <a:r>
+              <a:rPr lang="de-DE" sz="2400" b="0">
+                <a:solidFill>
+                  <a:srgbClr val="006600"/>
+                </a:solidFill>
+                <a:latin typeface="Calibri Light" panose="020F0302020204030204" pitchFamily="34" charset="0"/>
+                <a:cs typeface="Calibri Light" panose="020F0302020204030204" pitchFamily="34" charset="0"/>
+              </a:rPr>
+              <a:t>a </a:t>
+            </a:r>
+            <a:r>
+              <a:rPr lang="de-DE" sz="2400" b="0" u="sng" smtClean="0">
+                <a:solidFill>
+                  <a:srgbClr val="006600"/>
+                </a:solidFill>
+                <a:latin typeface="Calibri Light" panose="020F0302020204030204" pitchFamily="34" charset="0"/>
+                <a:cs typeface="Calibri Light" panose="020F0302020204030204" pitchFamily="34" charset="0"/>
+              </a:rPr>
+              <a:t>set of resources</a:t>
+            </a:r>
+          </a:p>
+          <a:p>
+            <a:pPr marL="0" indent="0">
+              <a:buNone/>
+            </a:pPr>
+            <a:endParaRPr lang="de-DE" sz="2400" b="0" u="sng">
+              <a:solidFill>
+                <a:srgbClr val="006600"/>
+              </a:solidFill>
+              <a:latin typeface="Calibri Light" panose="020F0302020204030204" pitchFamily="34" charset="0"/>
+              <a:cs typeface="Calibri Light" panose="020F0302020204030204" pitchFamily="34" charset="0"/>
+            </a:endParaRPr>
+          </a:p>
+          <a:p>
+            <a:pPr marL="0" indent="0">
+              <a:buNone/>
+            </a:pPr>
+            <a:r>
+              <a:rPr lang="de-DE" sz="2400" b="0">
+                <a:solidFill>
+                  <a:srgbClr val="006600"/>
+                </a:solidFill>
+                <a:latin typeface="Calibri Light" panose="020F0302020204030204" pitchFamily="34" charset="0"/>
+                <a:cs typeface="Calibri Light" panose="020F0302020204030204" pitchFamily="34" charset="0"/>
+              </a:rPr>
+              <a:t>	</a:t>
+            </a:r>
+            <a:r>
+              <a:rPr lang="de-DE" sz="2400" b="0" smtClean="0">
+                <a:solidFill>
+                  <a:srgbClr val="006600"/>
+                </a:solidFill>
+                <a:latin typeface="Calibri Light" panose="020F0302020204030204" pitchFamily="34" charset="0"/>
+                <a:cs typeface="Calibri Light" panose="020F0302020204030204" pitchFamily="34" charset="0"/>
+              </a:rPr>
+              <a:t>    * Input resource = </a:t>
+            </a:r>
+          </a:p>
+          <a:p>
+            <a:pPr marL="0" indent="0">
+              <a:buNone/>
+            </a:pPr>
+            <a:r>
+              <a:rPr lang="de-DE" sz="2400" b="0">
+                <a:solidFill>
+                  <a:srgbClr val="006600"/>
+                </a:solidFill>
+                <a:latin typeface="Calibri Light" panose="020F0302020204030204" pitchFamily="34" charset="0"/>
+                <a:cs typeface="Calibri Light" panose="020F0302020204030204" pitchFamily="34" charset="0"/>
+              </a:rPr>
+              <a:t> </a:t>
+            </a:r>
+            <a:r>
+              <a:rPr lang="de-DE" sz="2400" b="0" smtClean="0">
+                <a:solidFill>
+                  <a:srgbClr val="006600"/>
+                </a:solidFill>
+                <a:latin typeface="Calibri Light" panose="020F0302020204030204" pitchFamily="34" charset="0"/>
+                <a:cs typeface="Calibri Light" panose="020F0302020204030204" pitchFamily="34" charset="0"/>
+              </a:rPr>
+              <a:t>          		a resource from the target of the parent shape</a:t>
+            </a:r>
+            <a:endParaRPr lang="de-DE" sz="2400" b="0" i="1" smtClean="0">
+              <a:solidFill>
+                <a:srgbClr val="006600"/>
+              </a:solidFill>
+              <a:latin typeface="Calibri Light" panose="020F0302020204030204" pitchFamily="34" charset="0"/>
+              <a:cs typeface="Calibri Light" panose="020F0302020204030204" pitchFamily="34" charset="0"/>
+            </a:endParaRPr>
+          </a:p>
+          <a:p>
+            <a:pPr marL="0" indent="0">
+              <a:buNone/>
+            </a:pPr>
+            <a:r>
+              <a:rPr lang="de-DE" sz="2400" b="0" smtClean="0">
+                <a:solidFill>
+                  <a:srgbClr val="006600"/>
+                </a:solidFill>
+                <a:latin typeface="Calibri Light" panose="020F0302020204030204" pitchFamily="34" charset="0"/>
+                <a:cs typeface="Calibri Light" panose="020F0302020204030204" pitchFamily="34" charset="0"/>
+              </a:rPr>
+              <a:t>	    * Output resources=</a:t>
+            </a:r>
+          </a:p>
+          <a:p>
+            <a:pPr marL="0" indent="0">
+              <a:buNone/>
+            </a:pPr>
+            <a:r>
+              <a:rPr lang="de-DE" sz="2400" b="0">
+                <a:solidFill>
+                  <a:srgbClr val="006600"/>
+                </a:solidFill>
+                <a:latin typeface="Calibri Light" panose="020F0302020204030204" pitchFamily="34" charset="0"/>
+                <a:cs typeface="Calibri Light" panose="020F0302020204030204" pitchFamily="34" charset="0"/>
+              </a:rPr>
+              <a:t>	</a:t>
+            </a:r>
+            <a:r>
+              <a:rPr lang="de-DE" sz="2400" b="0" smtClean="0">
+                <a:solidFill>
+                  <a:srgbClr val="006600"/>
+                </a:solidFill>
+                <a:latin typeface="Calibri Light" panose="020F0302020204030204" pitchFamily="34" charset="0"/>
+                <a:cs typeface="Calibri Light" panose="020F0302020204030204" pitchFamily="34" charset="0"/>
+              </a:rPr>
+              <a:t>	the target of this shape</a:t>
+            </a:r>
+            <a:endParaRPr lang="de-DE" sz="2400" b="0">
+              <a:solidFill>
+                <a:srgbClr val="006600"/>
+              </a:solidFill>
+              <a:latin typeface="Calibri Light" panose="020F0302020204030204" pitchFamily="34" charset="0"/>
+              <a:cs typeface="Calibri Light" panose="020F0302020204030204" pitchFamily="34" charset="0"/>
+            </a:endParaRPr>
+          </a:p>
+        </p:txBody>
+      </p:sp>
+    </p:spTree>
+    <p:extLst>
+      <p:ext uri="{BB962C8B-B14F-4D97-AF65-F5344CB8AC3E}">
+        <p14:creationId xmlns:p14="http://schemas.microsoft.com/office/powerpoint/2010/main" val="2667591451"/>
+      </p:ext>
+    </p:extLst>
+  </p:cSld>
+  <p:clrMapOvr>
+    <a:masterClrMapping/>
+  </p:clrMapOvr>
+</p:sld>
+</file>
+
+<file path=ppt/slides/slide15.xml><?xml version="1.0" encoding="utf-8"?>
+<p:sld xmlns:a="http://schemas.openxmlformats.org/drawingml/2006/main" xmlns:r="http://schemas.openxmlformats.org/officeDocument/2006/relationships" xmlns:p="http://schemas.openxmlformats.org/presentationml/2006/main">
+  <p:cSld>
+    <p:spTree>
+      <p:nvGrpSpPr>
+        <p:cNvPr id="1" name=""/>
+        <p:cNvGrpSpPr/>
+        <p:nvPr/>
+      </p:nvGrpSpPr>
+      <p:grpSpPr>
+        <a:xfrm>
+          <a:off x="0" y="0"/>
+          <a:ext cx="0" cy="0"/>
+          <a:chOff x="0" y="0"/>
+          <a:chExt cx="0" cy="0"/>
+        </a:xfrm>
+      </p:grpSpPr>
+      <p:sp>
+        <p:nvSpPr>
+          <p:cNvPr id="2" name="Title 1"/>
+          <p:cNvSpPr>
+            <a:spLocks noGrp="1"/>
+          </p:cNvSpPr>
+          <p:nvPr>
+            <p:ph type="title"/>
+          </p:nvPr>
+        </p:nvSpPr>
+        <p:spPr>
+          <a:xfrm>
+            <a:off x="457200" y="116632"/>
+            <a:ext cx="7543800" cy="1295400"/>
+          </a:xfrm>
+        </p:spPr>
+        <p:txBody>
+          <a:bodyPr/>
+          <a:lstStyle/>
+          <a:p>
+            <a:r>
+              <a:rPr lang="de-DE" smtClean="0">
+                <a:solidFill>
+                  <a:srgbClr val="006600"/>
+                </a:solidFill>
+                <a:latin typeface="Calibri Light" panose="020F0302020204030204" pitchFamily="34" charset="0"/>
+                <a:cs typeface="Calibri Light" panose="020F0302020204030204" pitchFamily="34" charset="0"/>
+              </a:rPr>
+              <a:t>Link definition</a:t>
+            </a:r>
+            <a:endParaRPr lang="de-DE">
+              <a:solidFill>
+                <a:srgbClr val="006600"/>
+              </a:solidFill>
+              <a:latin typeface="Calibri Light" panose="020F0302020204030204" pitchFamily="34" charset="0"/>
+              <a:cs typeface="Calibri Light" panose="020F0302020204030204" pitchFamily="34" charset="0"/>
+            </a:endParaRPr>
+          </a:p>
+        </p:txBody>
+      </p:sp>
+      <p:sp>
+        <p:nvSpPr>
+          <p:cNvPr id="3" name="Content Placeholder 2"/>
+          <p:cNvSpPr>
+            <a:spLocks noGrp="1"/>
+          </p:cNvSpPr>
+          <p:nvPr>
+            <p:ph idx="1"/>
+          </p:nvPr>
+        </p:nvSpPr>
+        <p:spPr/>
+        <p:txBody>
+          <a:bodyPr/>
+          <a:lstStyle/>
+          <a:p>
+            <a:r>
+              <a:rPr lang="de-DE" sz="2400" smtClean="0">
+                <a:solidFill>
+                  <a:srgbClr val="006600"/>
+                </a:solidFill>
+                <a:latin typeface="Calibri Light" panose="020F0302020204030204" pitchFamily="34" charset="0"/>
+                <a:cs typeface="Calibri Light" panose="020F0302020204030204" pitchFamily="34" charset="0"/>
+              </a:rPr>
+              <a:t>A Link Definition is a function:</a:t>
+            </a:r>
+          </a:p>
+          <a:p>
+            <a:endParaRPr lang="de-DE" sz="2400">
+              <a:solidFill>
+                <a:srgbClr val="006600"/>
+              </a:solidFill>
+              <a:latin typeface="Calibri Light" panose="020F0302020204030204" pitchFamily="34" charset="0"/>
+              <a:cs typeface="Calibri Light" panose="020F0302020204030204" pitchFamily="34" charset="0"/>
+            </a:endParaRPr>
+          </a:p>
+          <a:p>
+            <a:endParaRPr lang="de-DE" sz="2400" smtClean="0">
+              <a:solidFill>
+                <a:srgbClr val="006600"/>
+              </a:solidFill>
+              <a:latin typeface="Calibri Light" panose="020F0302020204030204" pitchFamily="34" charset="0"/>
+              <a:cs typeface="Calibri Light" panose="020F0302020204030204" pitchFamily="34" charset="0"/>
+            </a:endParaRPr>
+          </a:p>
+          <a:p>
+            <a:r>
+              <a:rPr lang="de-DE" sz="2400" smtClean="0">
+                <a:solidFill>
+                  <a:srgbClr val="006600"/>
+                </a:solidFill>
+                <a:latin typeface="Calibri Light" panose="020F0302020204030204" pitchFamily="34" charset="0"/>
+                <a:cs typeface="Calibri Light" panose="020F0302020204030204" pitchFamily="34" charset="0"/>
+              </a:rPr>
+              <a:t>Schema representation: </a:t>
+            </a:r>
+          </a:p>
+          <a:p>
+            <a:pPr lvl="1"/>
+            <a:r>
+              <a:rPr lang="de-DE" sz="2000" smtClean="0">
+                <a:solidFill>
+                  <a:srgbClr val="006600"/>
+                </a:solidFill>
+                <a:latin typeface="Calibri Light" panose="020F0302020204030204" pitchFamily="34" charset="0"/>
+                <a:cs typeface="Calibri Light" panose="020F0302020204030204" pitchFamily="34" charset="0"/>
+              </a:rPr>
+              <a:t>Either:	&lt;linkDef&gt; element</a:t>
+            </a:r>
+          </a:p>
+          <a:p>
+            <a:pPr lvl="1"/>
+            <a:r>
+              <a:rPr lang="de-DE" sz="2000" smtClean="0">
+                <a:solidFill>
+                  <a:srgbClr val="006600"/>
+                </a:solidFill>
+                <a:latin typeface="Calibri Light" panose="020F0302020204030204" pitchFamily="34" charset="0"/>
+                <a:cs typeface="Calibri Light" panose="020F0302020204030204" pitchFamily="34" charset="0"/>
+              </a:rPr>
+              <a:t>Or:	Attributes and child elements of a „link using element“</a:t>
+            </a:r>
+          </a:p>
+          <a:p>
+            <a:endParaRPr lang="de-DE" sz="2400">
+              <a:solidFill>
+                <a:srgbClr val="006600"/>
+              </a:solidFill>
+              <a:latin typeface="Calibri Light" panose="020F0302020204030204" pitchFamily="34" charset="0"/>
+              <a:cs typeface="Calibri Light" panose="020F0302020204030204" pitchFamily="34" charset="0"/>
+            </a:endParaRPr>
+          </a:p>
+          <a:p>
+            <a:r>
+              <a:rPr lang="de-DE" sz="2400" smtClean="0">
+                <a:solidFill>
+                  <a:srgbClr val="006600"/>
+                </a:solidFill>
+                <a:latin typeface="Calibri Light" panose="020F0302020204030204" pitchFamily="34" charset="0"/>
+                <a:cs typeface="Calibri Light" panose="020F0302020204030204" pitchFamily="34" charset="0"/>
+              </a:rPr>
+              <a:t>Link using elements:</a:t>
+            </a:r>
+          </a:p>
+          <a:p>
+            <a:pPr lvl="1"/>
+            <a:r>
+              <a:rPr lang="de-DE" sz="2000" smtClean="0">
+                <a:solidFill>
+                  <a:srgbClr val="006600"/>
+                </a:solidFill>
+                <a:latin typeface="Calibri Light" panose="020F0302020204030204" pitchFamily="34" charset="0"/>
+                <a:cs typeface="Calibri Light" panose="020F0302020204030204" pitchFamily="34" charset="0"/>
+              </a:rPr>
+              <a:t>Shapes			&lt;file&gt;, &lt;folder&gt;</a:t>
+            </a:r>
+          </a:p>
+          <a:p>
+            <a:pPr lvl="1"/>
+            <a:r>
+              <a:rPr lang="de-DE" sz="2000" smtClean="0">
+                <a:solidFill>
+                  <a:srgbClr val="006600"/>
+                </a:solidFill>
+                <a:latin typeface="Calibri Light" panose="020F0302020204030204" pitchFamily="34" charset="0"/>
+                <a:cs typeface="Calibri Light" panose="020F0302020204030204" pitchFamily="34" charset="0"/>
+              </a:rPr>
+              <a:t>Links constraint		&lt;links&gt;</a:t>
+            </a:r>
+          </a:p>
+          <a:p>
+            <a:pPr lvl="1"/>
+            <a:r>
+              <a:rPr lang="de-DE" sz="2000" smtClean="0">
+                <a:solidFill>
+                  <a:srgbClr val="006600"/>
+                </a:solidFill>
+                <a:latin typeface="Calibri Light" panose="020F0302020204030204" pitchFamily="34" charset="0"/>
+                <a:cs typeface="Calibri Light" panose="020F0302020204030204" pitchFamily="34" charset="0"/>
+              </a:rPr>
+              <a:t>Pair-based constraints	&lt;valueCompared&gt;, &lt;docSimilar&gt;, … </a:t>
+            </a:r>
+          </a:p>
+        </p:txBody>
+      </p:sp>
+      <p:sp>
+        <p:nvSpPr>
+          <p:cNvPr id="5" name="TextBox 4"/>
+          <p:cNvSpPr txBox="1"/>
+          <p:nvPr/>
+        </p:nvSpPr>
+        <p:spPr>
+          <a:xfrm>
+            <a:off x="323528" y="2276872"/>
+            <a:ext cx="8820472" cy="461665"/>
+          </a:xfrm>
+          <a:prstGeom prst="rect">
+            <a:avLst/>
+          </a:prstGeom>
+          <a:noFill/>
+        </p:spPr>
+        <p:txBody>
+          <a:bodyPr wrap="square" rtlCol="0">
+            <a:spAutoFit/>
+          </a:bodyPr>
+          <a:lstStyle/>
+          <a:p>
+            <a:pPr marL="0" indent="0">
+              <a:buNone/>
+            </a:pPr>
+            <a:r>
+              <a:rPr lang="de-DE" sz="2400" b="0">
+                <a:solidFill>
+                  <a:srgbClr val="006600"/>
+                </a:solidFill>
+                <a:latin typeface="Calibri Light" panose="020F0302020204030204" pitchFamily="34" charset="0"/>
+                <a:cs typeface="Calibri Light" panose="020F0302020204030204" pitchFamily="34" charset="0"/>
+              </a:rPr>
+              <a:t>	Maps a </a:t>
+            </a:r>
+            <a:r>
+              <a:rPr lang="de-DE" sz="2400" b="0" u="sng">
+                <a:solidFill>
+                  <a:srgbClr val="006600"/>
+                </a:solidFill>
+                <a:latin typeface="Calibri Light" panose="020F0302020204030204" pitchFamily="34" charset="0"/>
+                <a:cs typeface="Calibri Light" panose="020F0302020204030204" pitchFamily="34" charset="0"/>
+              </a:rPr>
+              <a:t>resource</a:t>
+            </a:r>
+            <a:r>
+              <a:rPr lang="de-DE" sz="2400" b="0">
+                <a:solidFill>
+                  <a:srgbClr val="006600"/>
+                </a:solidFill>
+                <a:latin typeface="Calibri Light" panose="020F0302020204030204" pitchFamily="34" charset="0"/>
+                <a:cs typeface="Calibri Light" panose="020F0302020204030204" pitchFamily="34" charset="0"/>
+              </a:rPr>
+              <a:t> to </a:t>
+            </a:r>
+            <a:r>
+              <a:rPr lang="de-DE" sz="2400" b="0">
+                <a:solidFill>
+                  <a:srgbClr val="006600"/>
+                </a:solidFill>
+                <a:latin typeface="Calibri Light" panose="020F0302020204030204" pitchFamily="34" charset="0"/>
+                <a:cs typeface="Calibri Light" panose="020F0302020204030204" pitchFamily="34" charset="0"/>
+              </a:rPr>
+              <a:t>a </a:t>
+            </a:r>
+            <a:r>
+              <a:rPr lang="de-DE" sz="2400" b="0" u="sng" smtClean="0">
+                <a:solidFill>
+                  <a:srgbClr val="006600"/>
+                </a:solidFill>
+                <a:latin typeface="Calibri Light" panose="020F0302020204030204" pitchFamily="34" charset="0"/>
+                <a:cs typeface="Calibri Light" panose="020F0302020204030204" pitchFamily="34" charset="0"/>
+              </a:rPr>
+              <a:t>set of resources</a:t>
+            </a:r>
+          </a:p>
+        </p:txBody>
+      </p:sp>
+    </p:spTree>
+    <p:extLst>
+      <p:ext uri="{BB962C8B-B14F-4D97-AF65-F5344CB8AC3E}">
+        <p14:creationId xmlns:p14="http://schemas.microsoft.com/office/powerpoint/2010/main" val="3416836337"/>
+      </p:ext>
+    </p:extLst>
+  </p:cSld>
+  <p:clrMapOvr>
+    <a:masterClrMapping/>
+  </p:clrMapOvr>
+</p:sld>
+</file>
+
+<file path=ppt/slides/slide16.xml><?xml version="1.0" encoding="utf-8"?>
+<p:sld xmlns:a="http://schemas.openxmlformats.org/drawingml/2006/main" xmlns:r="http://schemas.openxmlformats.org/officeDocument/2006/relationships" xmlns:p="http://schemas.openxmlformats.org/presentationml/2006/main">
+  <p:cSld>
+    <p:spTree>
+      <p:nvGrpSpPr>
+        <p:cNvPr id="1" name=""/>
+        <p:cNvGrpSpPr/>
+        <p:nvPr/>
+      </p:nvGrpSpPr>
+      <p:grpSpPr>
+        <a:xfrm>
+          <a:off x="0" y="0"/>
+          <a:ext cx="0" cy="0"/>
+          <a:chOff x="0" y="0"/>
+          <a:chExt cx="0" cy="0"/>
+        </a:xfrm>
+      </p:grpSpPr>
+      <p:sp>
+        <p:nvSpPr>
+          <p:cNvPr id="4" name="Date Placeholder 3"/>
+          <p:cNvSpPr>
+            <a:spLocks noGrp="1"/>
+          </p:cNvSpPr>
+          <p:nvPr>
+            <p:ph type="dt" sz="half" idx="10"/>
+          </p:nvPr>
+        </p:nvSpPr>
+        <p:spPr/>
+        <p:txBody>
+          <a:bodyPr/>
+          <a:lstStyle/>
+          <a:p>
+            <a:pPr>
+              <a:defRPr/>
+            </a:pPr>
+            <a:r>
+              <a:rPr lang="de-DE" altLang="de-DE" smtClean="0"/>
+              <a:t>2020-10-08</a:t>
+            </a:r>
+            <a:endParaRPr lang="de-DE" altLang="en-US"/>
+          </a:p>
+        </p:txBody>
+      </p:sp>
+      <p:sp>
+        <p:nvSpPr>
+          <p:cNvPr id="5" name="Footer Placeholder 4"/>
+          <p:cNvSpPr>
+            <a:spLocks noGrp="1"/>
+          </p:cNvSpPr>
+          <p:nvPr>
+            <p:ph type="ftr" sz="quarter" idx="11"/>
+          </p:nvPr>
+        </p:nvSpPr>
+        <p:spPr/>
+        <p:txBody>
+          <a:bodyPr/>
+          <a:lstStyle/>
+          <a:p>
+            <a:pPr>
+              <a:defRPr/>
+            </a:pPr>
+            <a:r>
+              <a:rPr lang="de-DE" altLang="en-US" smtClean="0"/>
+              <a:t>Greenfox</a:t>
+            </a:r>
+            <a:endParaRPr lang="de-DE" altLang="en-US"/>
+          </a:p>
+        </p:txBody>
+      </p:sp>
+      <p:sp>
+        <p:nvSpPr>
+          <p:cNvPr id="6" name="Slide Number Placeholder 5"/>
+          <p:cNvSpPr>
+            <a:spLocks noGrp="1"/>
+          </p:cNvSpPr>
+          <p:nvPr>
+            <p:ph type="sldNum" sz="quarter" idx="12"/>
+          </p:nvPr>
+        </p:nvSpPr>
+        <p:spPr/>
+        <p:txBody>
+          <a:bodyPr/>
+          <a:lstStyle/>
+          <a:p>
+            <a:pPr>
+              <a:defRPr/>
+            </a:pPr>
+            <a:fld id="{F031B2F4-27D1-4E53-97CF-1947CD75B185}" type="slidenum">
+              <a:rPr lang="de-DE" altLang="en-US" smtClean="0"/>
+              <a:pPr>
+                <a:defRPr/>
+              </a:pPr>
+              <a:t>16</a:t>
+            </a:fld>
+            <a:endParaRPr lang="de-DE" altLang="en-US"/>
+          </a:p>
+        </p:txBody>
+      </p:sp>
+      <p:sp>
+        <p:nvSpPr>
+          <p:cNvPr id="11" name="Title 1"/>
+          <p:cNvSpPr>
+            <a:spLocks noGrp="1"/>
+          </p:cNvSpPr>
+          <p:nvPr>
+            <p:ph type="title"/>
+          </p:nvPr>
+        </p:nvSpPr>
+        <p:spPr>
+          <a:xfrm>
+            <a:off x="457200" y="116632"/>
+            <a:ext cx="8075240" cy="1295400"/>
+          </a:xfrm>
+        </p:spPr>
+        <p:txBody>
+          <a:bodyPr/>
+          <a:lstStyle/>
+          <a:p>
+            <a:r>
+              <a:rPr lang="de-DE" smtClean="0">
+                <a:solidFill>
+                  <a:srgbClr val="006600"/>
+                </a:solidFill>
+                <a:latin typeface="Calibri Light" panose="020F0302020204030204" pitchFamily="34" charset="0"/>
+                <a:cs typeface="Calibri Light" panose="020F0302020204030204" pitchFamily="34" charset="0"/>
+              </a:rPr>
+              <a:t>Target Declaration:</a:t>
+            </a:r>
+            <a:br>
+              <a:rPr lang="de-DE" smtClean="0">
+                <a:solidFill>
+                  <a:srgbClr val="006600"/>
+                </a:solidFill>
+                <a:latin typeface="Calibri Light" panose="020F0302020204030204" pitchFamily="34" charset="0"/>
+                <a:cs typeface="Calibri Light" panose="020F0302020204030204" pitchFamily="34" charset="0"/>
+              </a:rPr>
+            </a:br>
+            <a:r>
+              <a:rPr lang="de-DE">
+                <a:solidFill>
+                  <a:srgbClr val="006600"/>
+                </a:solidFill>
+                <a:latin typeface="Calibri Light" panose="020F0302020204030204" pitchFamily="34" charset="0"/>
+                <a:cs typeface="Calibri Light" panose="020F0302020204030204" pitchFamily="34" charset="0"/>
+              </a:rPr>
+              <a:t> </a:t>
+            </a:r>
+            <a:r>
+              <a:rPr lang="de-DE" smtClean="0">
+                <a:solidFill>
+                  <a:srgbClr val="006600"/>
+                </a:solidFill>
+                <a:latin typeface="Calibri Light" panose="020F0302020204030204" pitchFamily="34" charset="0"/>
+                <a:cs typeface="Calibri Light" panose="020F0302020204030204" pitchFamily="34" charset="0"/>
+              </a:rPr>
+              <a:t>  a </a:t>
+            </a:r>
+            <a:r>
+              <a:rPr lang="de-DE" i="1" smtClean="0">
+                <a:solidFill>
+                  <a:srgbClr val="006600"/>
+                </a:solidFill>
+                <a:latin typeface="Calibri Light" panose="020F0302020204030204" pitchFamily="34" charset="0"/>
+                <a:cs typeface="Calibri Light" panose="020F0302020204030204" pitchFamily="34" charset="0"/>
+              </a:rPr>
+              <a:t>Link Definition</a:t>
+            </a:r>
+            <a:r>
+              <a:rPr lang="de-DE" smtClean="0">
+                <a:solidFill>
+                  <a:srgbClr val="006600"/>
+                </a:solidFill>
+                <a:latin typeface="Calibri Light" panose="020F0302020204030204" pitchFamily="34" charset="0"/>
+                <a:cs typeface="Calibri Light" panose="020F0302020204030204" pitchFamily="34" charset="0"/>
+              </a:rPr>
+              <a:t> (local | referenced)</a:t>
+            </a:r>
+            <a:endParaRPr lang="de-DE">
+              <a:solidFill>
+                <a:srgbClr val="006600"/>
+              </a:solidFill>
+              <a:latin typeface="Calibri Light" panose="020F0302020204030204" pitchFamily="34" charset="0"/>
+              <a:cs typeface="Calibri Light" panose="020F0302020204030204" pitchFamily="34" charset="0"/>
+            </a:endParaRPr>
+          </a:p>
+        </p:txBody>
+      </p:sp>
+      <p:pic>
+        <p:nvPicPr>
+          <p:cNvPr id="12" name="Picture 11"/>
+          <p:cNvPicPr>
+            <a:picLocks noChangeAspect="1"/>
+          </p:cNvPicPr>
+          <p:nvPr/>
+        </p:nvPicPr>
+        <p:blipFill>
+          <a:blip r:embed="rId2"/>
+          <a:stretch>
+            <a:fillRect/>
+          </a:stretch>
+        </p:blipFill>
+        <p:spPr>
+          <a:xfrm>
+            <a:off x="0" y="1847233"/>
+            <a:ext cx="9144000" cy="4678111"/>
+          </a:xfrm>
+          <a:prstGeom prst="rect">
+            <a:avLst/>
+          </a:prstGeom>
+        </p:spPr>
+      </p:pic>
+    </p:spTree>
+    <p:extLst>
+      <p:ext uri="{BB962C8B-B14F-4D97-AF65-F5344CB8AC3E}">
+        <p14:creationId xmlns:p14="http://schemas.microsoft.com/office/powerpoint/2010/main" val="1574885656"/>
+      </p:ext>
+    </p:extLst>
+  </p:cSld>
+  <p:clrMapOvr>
+    <a:masterClrMapping/>
+  </p:clrMapOvr>
+</p:sld>
+</file>
+
 <file path=ppt/slides/slide2.xml><?xml version="1.0" encoding="utf-8"?>
 <p:sld xmlns:a="http://schemas.openxmlformats.org/drawingml/2006/main" xmlns:r="http://schemas.openxmlformats.org/officeDocument/2006/relationships" xmlns:p="http://schemas.openxmlformats.org/presentationml/2006/main">
   <p:cSld>
@@ -14946,11 +17632,7 @@
           <a:p>
             <a:r>
               <a:rPr lang="de-DE" smtClean="0"/>
-              <a:t>File system </a:t>
-            </a:r>
-            <a:r>
-              <a:rPr lang="de-DE" smtClean="0"/>
-              <a:t>tree validation</a:t>
+              <a:t>File system tree validation</a:t>
             </a:r>
             <a:endParaRPr lang="de-DE"/>
           </a:p>
@@ -15075,13 +17757,25 @@
           <a:p>
             <a:r>
               <a:rPr lang="de-DE" sz="2000" smtClean="0"/>
-              <a:t>   selected root folder +</a:t>
-            </a:r>
-          </a:p>
-          <a:p>
+              <a:t>   </a:t>
+            </a:r>
             <a:r>
               <a:rPr lang="de-DE" sz="2000" smtClean="0"/>
-              <a:t>   folders/files </a:t>
+              <a:t>some folder </a:t>
+            </a:r>
+            <a:r>
+              <a:rPr lang="de-DE" sz="2000" smtClean="0"/>
+              <a:t>+</a:t>
+            </a:r>
+          </a:p>
+          <a:p>
+            <a:r>
+              <a:rPr lang="de-DE" sz="2000" smtClean="0"/>
+              <a:t>   </a:t>
+            </a:r>
+            <a:r>
+              <a:rPr lang="de-DE" sz="2000" smtClean="0"/>
+              <a:t>  all folders/files </a:t>
             </a:r>
             <a:r>
               <a:rPr lang="de-DE" sz="2000" smtClean="0"/>
@@ -15128,8 +17822,21 @@
           <a:p>
             <a:r>
               <a:rPr lang="de-DE" sz="2000" smtClean="0"/>
-              <a:t>   check of conformance to a set of constraints</a:t>
-            </a:r>
+              <a:t>   </a:t>
+            </a:r>
+            <a:r>
+              <a:rPr lang="de-DE" sz="2000" smtClean="0"/>
+              <a:t>check: conformance </a:t>
+            </a:r>
+            <a:r>
+              <a:rPr lang="de-DE" sz="2000" smtClean="0"/>
+              <a:t>to a set of </a:t>
+            </a:r>
+            <a:r>
+              <a:rPr lang="de-DE" sz="2000" smtClean="0"/>
+              <a:t>constraints =</a:t>
+            </a:r>
+            <a:endParaRPr lang="de-DE" sz="2000" smtClean="0"/>
           </a:p>
           <a:p>
             <a:r>
@@ -15138,8 +17845,21 @@
             </a:r>
             <a:r>
               <a:rPr lang="de-DE" sz="2000" smtClean="0"/>
-              <a:t>  (a „schema“)</a:t>
-            </a:r>
+              <a:t>  </a:t>
+            </a:r>
+            <a:r>
+              <a:rPr lang="de-DE" sz="2000" smtClean="0"/>
+              <a:t>  a </a:t>
+            </a:r>
+            <a:r>
+              <a:rPr lang="de-DE" sz="2000" smtClean="0"/>
+              <a:t>„schema</a:t>
+            </a:r>
+            <a:r>
+              <a:rPr lang="de-DE" sz="2000" smtClean="0"/>
+              <a:t>“</a:t>
+            </a:r>
+            <a:endParaRPr lang="de-DE" sz="2000" smtClean="0"/>
           </a:p>
         </p:txBody>
       </p:sp>
@@ -15181,25 +17901,33 @@
           <a:p>
             <a:r>
               <a:rPr lang="de-DE" sz="2000" smtClean="0"/>
-              <a:t>   the outcome of a </a:t>
+              <a:t>   the outcome of </a:t>
+            </a:r>
+            <a:r>
+              <a:rPr lang="de-DE" sz="2000" smtClean="0"/>
+              <a:t>one check</a:t>
+            </a:r>
+            <a:r>
+              <a:rPr lang="de-DE" sz="2000" smtClean="0"/>
+              <a:t>:</a:t>
+            </a:r>
+          </a:p>
+          <a:p>
+            <a:r>
+              <a:rPr lang="de-DE" sz="2000" smtClean="0"/>
+              <a:t>     </a:t>
             </a:r>
             <a:r>
               <a:rPr lang="de-DE" sz="2000" i="1" smtClean="0"/>
-              <a:t>single</a:t>
+              <a:t>single resource</a:t>
             </a:r>
             <a:r>
               <a:rPr lang="de-DE" sz="2000" smtClean="0"/>
-              <a:t> check:</a:t>
-            </a:r>
-          </a:p>
-          <a:p>
-            <a:r>
-              <a:rPr lang="de-DE" sz="2000"/>
-              <a:t> </a:t>
-            </a:r>
-            <a:r>
-              <a:rPr lang="de-DE" sz="2000" smtClean="0"/>
-              <a:t>  single resource checked against a single constraint</a:t>
+              <a:t> checked against a </a:t>
+            </a:r>
+            <a:r>
+              <a:rPr lang="de-DE" sz="2000" i="1" smtClean="0"/>
+              <a:t>single constraint</a:t>
             </a:r>
           </a:p>
         </p:txBody>
@@ -15242,8 +17970,13 @@
           <a:p>
             <a:r>
               <a:rPr lang="de-DE" sz="2000" smtClean="0"/>
-              <a:t>   a representation of the collected results -</a:t>
-            </a:r>
+              <a:t>   </a:t>
+            </a:r>
+            <a:r>
+              <a:rPr lang="de-DE" sz="2000" smtClean="0"/>
+              <a:t>collected validation results,</a:t>
+            </a:r>
+            <a:endParaRPr lang="de-DE" sz="2000" smtClean="0"/>
           </a:p>
           <a:p>
             <a:r>
@@ -15252,8 +17985,13 @@
             </a:r>
             <a:r>
               <a:rPr lang="de-DE" sz="2000" smtClean="0"/>
-              <a:t>  e.g. listing filtered results or presenting statistics</a:t>
-            </a:r>
+              <a:t>  </a:t>
+            </a:r>
+            <a:r>
+              <a:rPr lang="de-DE" sz="2000" smtClean="0"/>
+              <a:t>  mapped to something palatable</a:t>
+            </a:r>
+            <a:endParaRPr lang="de-DE" sz="2000" smtClean="0"/>
           </a:p>
         </p:txBody>
       </p:sp>
@@ -15400,15 +18138,7 @@
                   <a:srgbClr val="006600"/>
                 </a:solidFill>
               </a:rPr>
-              <a:t>Single </a:t>
-            </a:r>
-            <a:r>
-              <a:rPr lang="de-DE" sz="2000" b="1" smtClean="0">
-                <a:solidFill>
-                  <a:srgbClr val="006600"/>
-                </a:solidFill>
-              </a:rPr>
-              <a:t>file</a:t>
+              <a:t>Single file</a:t>
             </a:r>
             <a:r>
               <a:rPr lang="de-DE" sz="2000" smtClean="0"/>
@@ -15426,11 +18156,7 @@
             </a:r>
             <a:r>
               <a:rPr lang="de-DE" sz="2000" smtClean="0"/>
-              <a:t> are </a:t>
-            </a:r>
-            <a:r>
-              <a:rPr lang="de-DE" sz="2000" smtClean="0"/>
-              <a:t>simply </a:t>
+              <a:t> are simply </a:t>
             </a:r>
             <a:r>
               <a:rPr lang="de-DE" sz="2000" b="1" i="1" smtClean="0">
@@ -15450,24 +18176,38 @@
             </a:r>
           </a:p>
           <a:p>
+            <a:pPr marL="0" indent="0">
+              <a:buNone/>
+            </a:pPr>
+            <a:endParaRPr lang="de-DE" sz="2000" smtClean="0"/>
+          </a:p>
+          <a:p>
             <a:pPr lvl="1"/>
             <a:r>
+              <a:rPr lang="de-DE" sz="1600"/>
+              <a:t>A product to be shipped</a:t>
+            </a:r>
+          </a:p>
+          <a:p>
+            <a:pPr lvl="1"/>
+            <a:r>
               <a:rPr lang="de-DE" sz="1600" smtClean="0"/>
-              <a:t>A set of applications in use</a:t>
+              <a:t>A </a:t>
+            </a:r>
+            <a:r>
+              <a:rPr lang="de-DE" sz="1600" smtClean="0"/>
+              <a:t>set of applications in use</a:t>
             </a:r>
           </a:p>
           <a:p>
             <a:pPr lvl="1"/>
             <a:r>
               <a:rPr lang="de-DE" sz="1600" smtClean="0"/>
-              <a:t>A product to be shipped</a:t>
-            </a:r>
-          </a:p>
-          <a:p>
-            <a:pPr lvl="1"/>
+              <a:t>Critical </a:t>
+            </a:r>
             <a:r>
               <a:rPr lang="de-DE" sz="1600" smtClean="0"/>
-              <a:t>Critical components of infrastructure</a:t>
+              <a:t>components of infrastructure</a:t>
             </a:r>
           </a:p>
           <a:p>
@@ -15583,13 +18323,13 @@
         </p:nvSpPr>
         <p:spPr bwMode="auto">
           <a:xfrm>
-            <a:off x="5868143" y="4365104"/>
-            <a:ext cx="3275857" cy="2232248"/>
+            <a:off x="5376259" y="4365104"/>
+            <a:ext cx="3746646" cy="2232248"/>
           </a:xfrm>
           <a:prstGeom prst="wedgeRoundRectCallout">
             <a:avLst>
-              <a:gd name="adj1" fmla="val -123387"/>
-              <a:gd name="adj2" fmla="val -34689"/>
+              <a:gd name="adj1" fmla="val -100974"/>
+              <a:gd name="adj2" fmla="val -30509"/>
               <a:gd name="adj3" fmla="val 16667"/>
             </a:avLst>
           </a:prstGeom>
@@ -15619,7 +18359,7 @@
           </a:bodyPr>
           <a:lstStyle/>
           <a:p>
-            <a:pPr marL="0" marR="0" indent="0" algn="l" defTabSz="914400" rtl="0" eaLnBrk="1" fontAlgn="base" latinLnBrk="0" hangingPunct="1">
+            <a:pPr marL="0" marR="0" indent="0" algn="ctr" defTabSz="914400" rtl="0" eaLnBrk="1" fontAlgn="base" latinLnBrk="0" hangingPunct="1">
               <a:lnSpc>
                 <a:spcPct val="100000"/>
               </a:lnSpc>
@@ -15641,15 +18381,16 @@
                   <a:noFill/>
                 </a:ln>
                 <a:solidFill>
-                  <a:schemeClr val="tx1"/>
+                  <a:srgbClr val="FF0000"/>
                 </a:solidFill>
                 <a:effectLst/>
               </a:rPr>
-              <a:t>No file forgotten? </a:t>
-            </a:r>
-          </a:p>
-          <a:p>
-            <a:pPr marL="0" marR="0" indent="0" algn="l" defTabSz="914400" rtl="0" eaLnBrk="1" fontAlgn="base" latinLnBrk="0" hangingPunct="1">
+              <a:t>SAMPLE WORRIES</a:t>
+            </a:r>
+            <a:endParaRPr lang="de-DE" i="1"/>
+          </a:p>
+          <a:p>
+            <a:pPr marL="0" marR="0" indent="0" algn="ctr" defTabSz="914400" rtl="0" eaLnBrk="1" fontAlgn="base" latinLnBrk="0" hangingPunct="1">
               <a:lnSpc>
                 <a:spcPct val="100000"/>
               </a:lnSpc>
@@ -15671,15 +18412,27 @@
                   <a:noFill/>
                 </a:ln>
                 <a:solidFill>
-                  <a:schemeClr val="tx1"/>
+                  <a:srgbClr val="006600"/>
                 </a:solidFill>
                 <a:effectLst/>
               </a:rPr>
-              <a:t>File versions correct? </a:t>
-            </a:r>
-          </a:p>
-          <a:p>
-            <a:pPr marL="0" marR="0" indent="0" algn="l" defTabSz="914400" rtl="0" eaLnBrk="1" fontAlgn="base" latinLnBrk="0" hangingPunct="1">
+              <a:t>No </a:t>
+            </a:r>
+            <a:r>
+              <a:rPr kumimoji="0" lang="de-DE" sz="1800" b="1" i="1" u="none" strike="noStrike" cap="none" normalizeH="0" smtClean="0">
+                <a:ln>
+                  <a:noFill/>
+                </a:ln>
+                <a:solidFill>
+                  <a:srgbClr val="006600"/>
+                </a:solidFill>
+                <a:effectLst/>
+              </a:rPr>
+              <a:t>file forgotten? </a:t>
+            </a:r>
+          </a:p>
+          <a:p>
+            <a:pPr marL="0" marR="0" indent="0" algn="ctr" defTabSz="914400" rtl="0" eaLnBrk="1" fontAlgn="base" latinLnBrk="0" hangingPunct="1">
               <a:lnSpc>
                 <a:spcPct val="100000"/>
               </a:lnSpc>
@@ -15696,16 +18449,20 @@
               <a:tabLst/>
             </a:pPr>
             <a:r>
-              <a:rPr lang="de-DE" i="1" baseline="0" smtClean="0"/>
-              <a:t>Log files </a:t>
-            </a:r>
-            <a:r>
-              <a:rPr lang="de-DE" i="1" smtClean="0"/>
-              <a:t>removed?</a:t>
-            </a:r>
-          </a:p>
-          <a:p>
-            <a:pPr marL="0" marR="0" indent="0" algn="l" defTabSz="914400" rtl="0" eaLnBrk="1" fontAlgn="base" latinLnBrk="0" hangingPunct="1">
+              <a:rPr kumimoji="0" lang="de-DE" sz="1800" b="1" i="1" u="none" strike="noStrike" cap="none" normalizeH="0" smtClean="0">
+                <a:ln>
+                  <a:noFill/>
+                </a:ln>
+                <a:solidFill>
+                  <a:srgbClr val="006600"/>
+                </a:solidFill>
+                <a:effectLst/>
+              </a:rPr>
+              <a:t>File versions correct? </a:t>
+            </a:r>
+          </a:p>
+          <a:p>
+            <a:pPr marL="0" marR="0" indent="0" algn="ctr" defTabSz="914400" rtl="0" eaLnBrk="1" fontAlgn="base" latinLnBrk="0" hangingPunct="1">
               <a:lnSpc>
                 <a:spcPct val="100000"/>
               </a:lnSpc>
@@ -15722,32 +18479,24 @@
               <a:tabLst/>
             </a:pPr>
             <a:r>
-              <a:rPr kumimoji="0" lang="de-DE" sz="1800" b="1" i="1" u="none" strike="noStrike" cap="none" normalizeH="0" baseline="0" smtClean="0">
-                <a:ln>
-                  <a:noFill/>
-                </a:ln>
+              <a:rPr lang="de-DE" i="1" baseline="0" smtClean="0">
                 <a:solidFill>
-                  <a:schemeClr val="tx1"/>
+                  <a:srgbClr val="006600"/>
                 </a:solidFill>
-                <a:effectLst/>
               </a:rPr>
-              <a:t>Documentation</a:t>
-            </a:r>
-            <a:r>
-              <a:rPr kumimoji="0" lang="de-DE" sz="1800" b="1" i="1" u="none" strike="noStrike" cap="none" normalizeH="0" smtClean="0">
-                <a:ln>
-                  <a:noFill/>
-                </a:ln>
+              <a:t>Log files </a:t>
+            </a:r>
+            <a:r>
+              <a:rPr lang="de-DE" i="1" smtClean="0">
                 <a:solidFill>
-                  <a:schemeClr val="tx1"/>
+                  <a:srgbClr val="006600"/>
                 </a:solidFill>
-                <a:effectLst/>
               </a:rPr>
-              <a:t> complete?</a:t>
-            </a:r>
-          </a:p>
-          <a:p>
-            <a:pPr marL="0" marR="0" indent="0" algn="l" defTabSz="914400" rtl="0" eaLnBrk="1" fontAlgn="base" latinLnBrk="0" hangingPunct="1">
+              <a:t>removed?</a:t>
+            </a:r>
+          </a:p>
+          <a:p>
+            <a:pPr marL="0" marR="0" indent="0" algn="ctr" defTabSz="914400" rtl="0" eaLnBrk="1" fontAlgn="base" latinLnBrk="0" hangingPunct="1">
               <a:lnSpc>
                 <a:spcPct val="100000"/>
               </a:lnSpc>
@@ -15764,12 +18513,32 @@
               <a:tabLst/>
             </a:pPr>
             <a:r>
-              <a:rPr lang="de-DE" i="1" baseline="0" smtClean="0"/>
-              <a:t>All translations included?</a:t>
-            </a:r>
-          </a:p>
-          <a:p>
-            <a:pPr marL="0" marR="0" indent="0" algn="l" defTabSz="914400" rtl="0" eaLnBrk="1" fontAlgn="base" latinLnBrk="0" hangingPunct="1">
+              <a:rPr kumimoji="0" lang="de-DE" sz="1800" b="1" i="1" u="none" strike="noStrike" cap="none" normalizeH="0" baseline="0" smtClean="0">
+                <a:ln>
+                  <a:noFill/>
+                </a:ln>
+                <a:solidFill>
+                  <a:srgbClr val="006600"/>
+                </a:solidFill>
+                <a:effectLst/>
+              </a:rPr>
+              <a:t>Documentation</a:t>
+            </a:r>
+            <a:r>
+              <a:rPr kumimoji="0" lang="de-DE" sz="1800" b="1" i="1" u="none" strike="noStrike" cap="none" normalizeH="0" smtClean="0">
+                <a:ln>
+                  <a:noFill/>
+                </a:ln>
+                <a:solidFill>
+                  <a:srgbClr val="006600"/>
+                </a:solidFill>
+                <a:effectLst/>
+              </a:rPr>
+              <a:t> complete?</a:t>
+            </a:r>
+          </a:p>
+          <a:p>
+            <a:pPr marL="0" marR="0" indent="0" algn="ctr" defTabSz="914400" rtl="0" eaLnBrk="1" fontAlgn="base" latinLnBrk="0" hangingPunct="1">
               <a:lnSpc>
                 <a:spcPct val="100000"/>
               </a:lnSpc>
@@ -15786,13 +18555,16 @@
               <a:tabLst/>
             </a:pPr>
             <a:r>
-              <a:rPr lang="de-DE" i="1" smtClean="0"/>
-              <a:t>All links updated?</a:t>
-            </a:r>
-            <a:endParaRPr lang="de-DE" i="1" baseline="0" smtClean="0"/>
-          </a:p>
-          <a:p>
-            <a:pPr marL="0" marR="0" indent="0" algn="l" defTabSz="914400" rtl="0" eaLnBrk="1" fontAlgn="base" latinLnBrk="0" hangingPunct="1">
+              <a:rPr lang="de-DE" i="1" baseline="0" smtClean="0">
+                <a:solidFill>
+                  <a:srgbClr val="006600"/>
+                </a:solidFill>
+              </a:rPr>
+              <a:t>All translations included?</a:t>
+            </a:r>
+          </a:p>
+          <a:p>
+            <a:pPr marL="0" marR="0" indent="0" algn="ctr" defTabSz="914400" rtl="0" eaLnBrk="1" fontAlgn="base" latinLnBrk="0" hangingPunct="1">
               <a:lnSpc>
                 <a:spcPct val="100000"/>
               </a:lnSpc>
@@ -15809,23 +18581,63 @@
               <a:tabLst/>
             </a:pPr>
             <a:r>
+              <a:rPr lang="de-DE" i="1" smtClean="0">
+                <a:solidFill>
+                  <a:srgbClr val="006600"/>
+                </a:solidFill>
+              </a:rPr>
+              <a:t>All links updated</a:t>
+            </a:r>
+            <a:r>
+              <a:rPr lang="de-DE" i="1" smtClean="0">
+                <a:solidFill>
+                  <a:srgbClr val="006600"/>
+                </a:solidFill>
+              </a:rPr>
+              <a:t>? </a:t>
+            </a:r>
+            <a:r>
               <a:rPr kumimoji="0" lang="de-DE" sz="1800" b="1" i="1" u="none" strike="noStrike" cap="none" normalizeH="0" smtClean="0">
                 <a:ln>
                   <a:noFill/>
                 </a:ln>
                 <a:solidFill>
-                  <a:schemeClr val="tx1"/>
+                  <a:srgbClr val="006600"/>
                 </a:solidFill>
                 <a:effectLst/>
               </a:rPr>
-              <a:t>            Etc. etc. etc.</a:t>
+              <a:t>Etc</a:t>
+            </a:r>
+            <a:r>
+              <a:rPr kumimoji="0" lang="de-DE" sz="1800" b="1" i="1" u="none" strike="noStrike" cap="none" normalizeH="0" smtClean="0">
+                <a:ln>
+                  <a:noFill/>
+                </a:ln>
+                <a:solidFill>
+                  <a:srgbClr val="006600"/>
+                </a:solidFill>
+                <a:effectLst/>
+              </a:rPr>
+              <a:t>. etc</a:t>
+            </a:r>
+            <a:r>
+              <a:rPr kumimoji="0" lang="de-DE" sz="1800" b="1" i="1" u="none" strike="noStrike" cap="none" normalizeH="0" smtClean="0">
+                <a:ln>
+                  <a:noFill/>
+                </a:ln>
+                <a:solidFill>
+                  <a:srgbClr val="006600"/>
+                </a:solidFill>
+                <a:effectLst/>
+              </a:rPr>
+              <a:t>.</a:t>
             </a:r>
             <a:endParaRPr kumimoji="0" lang="de-DE" sz="1800" b="1" i="1" u="none" strike="noStrike" cap="none" normalizeH="0" baseline="0" smtClean="0">
               <a:ln>
                 <a:noFill/>
               </a:ln>
               <a:solidFill>
-                <a:schemeClr val="tx1"/>
+                <a:srgbClr val="006600"/>
               </a:solidFill>
               <a:effectLst/>
             </a:endParaRPr>
@@ -15959,11 +18771,7 @@
             </a:r>
             <a:r>
               <a:rPr lang="de-DE" smtClean="0"/>
-              <a:t> - look </a:t>
-            </a:r>
-            <a:r>
-              <a:rPr lang="de-DE" smtClean="0"/>
-              <a:t>at a few constraint types</a:t>
+              <a:t> - look at a few constraint types</a:t>
             </a:r>
           </a:p>
           <a:p>
@@ -16119,10 +18927,18 @@
           <a:lstStyle/>
           <a:p>
             <a:r>
-              <a:rPr lang="de-DE" smtClean="0"/>
+              <a:rPr lang="de-DE" smtClean="0">
+                <a:solidFill>
+                  <a:srgbClr val="006600"/>
+                </a:solidFill>
+              </a:rPr>
               <a:t>Getting started …</a:t>
             </a:r>
-            <a:endParaRPr lang="de-DE"/>
+            <a:endParaRPr lang="de-DE">
+              <a:solidFill>
+                <a:srgbClr val="006600"/>
+              </a:solidFill>
+            </a:endParaRPr>
           </a:p>
         </p:txBody>
       </p:sp>
@@ -16215,8 +19031,8 @@
         </p:nvSpPr>
         <p:spPr>
           <a:xfrm>
-            <a:off x="1259632" y="2555746"/>
-            <a:ext cx="7511993" cy="2554545"/>
+            <a:off x="457200" y="2060848"/>
+            <a:ext cx="6734536" cy="2739211"/>
           </a:xfrm>
           <a:prstGeom prst="rect">
             <a:avLst/>
@@ -16235,47 +19051,86 @@
                   <a:srgbClr val="006600"/>
                 </a:solidFill>
               </a:rPr>
-              <a:t>A guided tour –</a:t>
-            </a:r>
-          </a:p>
-          <a:p>
-            <a:endParaRPr lang="de-DE" sz="3200" smtClean="0">
-              <a:solidFill>
-                <a:srgbClr val="006600"/>
-              </a:solidFill>
-            </a:endParaRPr>
-          </a:p>
-          <a:p>
+              <a:t>A guided </a:t>
+            </a:r>
             <a:r>
               <a:rPr lang="de-DE" sz="3200" smtClean="0">
                 <a:solidFill>
                   <a:srgbClr val="006600"/>
                 </a:solidFill>
               </a:rPr>
-              <a:t>   together building a schema in steps</a:t>
-            </a:r>
-          </a:p>
-          <a:p>
-            <a:endParaRPr lang="de-DE" sz="3200" smtClean="0">
+              <a:t>tour:</a:t>
+            </a:r>
+          </a:p>
+          <a:p>
+            <a:endParaRPr lang="de-DE" sz="2800" i="1" smtClean="0">
               <a:solidFill>
                 <a:srgbClr val="006600"/>
               </a:solidFill>
+              <a:latin typeface="Castellar" panose="020A0402060406010301" pitchFamily="18" charset="0"/>
             </a:endParaRPr>
           </a:p>
           <a:p>
             <a:r>
-              <a:rPr lang="de-DE" sz="3200" smtClean="0">
+              <a:rPr lang="de-DE" sz="2800" i="1" smtClean="0">
                 <a:solidFill>
                   <a:srgbClr val="006600"/>
                 </a:solidFill>
+                <a:latin typeface="Castellar" panose="020A0402060406010301" pitchFamily="18" charset="0"/>
               </a:rPr>
-              <a:t>      &amp; explaining each addition</a:t>
-            </a:r>
-            <a:endParaRPr lang="de-DE" sz="3200">
-              <a:solidFill>
-                <a:srgbClr val="006600"/>
-              </a:solidFill>
-            </a:endParaRPr>
+              <a:t>„A trivial file system tree</a:t>
+            </a:r>
+          </a:p>
+          <a:p>
+            <a:r>
+              <a:rPr lang="de-DE" sz="2800" i="1" smtClean="0">
+                <a:solidFill>
+                  <a:srgbClr val="006600"/>
+                </a:solidFill>
+                <a:latin typeface="Castellar" panose="020A0402060406010301" pitchFamily="18" charset="0"/>
+              </a:rPr>
+              <a:t>   Validated against a </a:t>
+            </a:r>
+          </a:p>
+          <a:p>
+            <a:r>
+              <a:rPr lang="de-DE" sz="2800" i="1">
+                <a:solidFill>
+                  <a:srgbClr val="006600"/>
+                </a:solidFill>
+                <a:latin typeface="Castellar" panose="020A0402060406010301" pitchFamily="18" charset="0"/>
+              </a:rPr>
+              <a:t> </a:t>
+            </a:r>
+            <a:r>
+              <a:rPr lang="de-DE" sz="2800" i="1" smtClean="0">
+                <a:solidFill>
+                  <a:srgbClr val="006600"/>
+                </a:solidFill>
+                <a:latin typeface="Castellar" panose="020A0402060406010301" pitchFamily="18" charset="0"/>
+              </a:rPr>
+              <a:t>     </a:t>
+            </a:r>
+            <a:r>
+              <a:rPr lang="de-DE" sz="2800" i="1" smtClean="0">
+                <a:solidFill>
+                  <a:srgbClr val="006600"/>
+                </a:solidFill>
+                <a:latin typeface="Castellar" panose="020A0402060406010301" pitchFamily="18" charset="0"/>
+              </a:rPr>
+              <a:t>non-trivial schema</a:t>
+            </a:r>
+          </a:p>
+          <a:p>
+            <a:r>
+              <a:rPr lang="de-DE" sz="2800" i="1" smtClean="0">
+                <a:solidFill>
+                  <a:srgbClr val="006600"/>
+                </a:solidFill>
+                <a:latin typeface="Castellar" panose="020A0402060406010301" pitchFamily="18" charset="0"/>
+              </a:rPr>
+              <a:t>         Developed in seven steps</a:t>
+            </a:r>
           </a:p>
         </p:txBody>
       </p:sp>
@@ -16296,6 +19151,895 @@
       </p:par>
     </p:tnLst>
   </p:timing>
+</p:sld>
+</file>
+
+<file path=ppt/slides/slide6.xml><?xml version="1.0" encoding="utf-8"?>
+<p:sld xmlns:a="http://schemas.openxmlformats.org/drawingml/2006/main" xmlns:r="http://schemas.openxmlformats.org/officeDocument/2006/relationships" xmlns:p="http://schemas.openxmlformats.org/presentationml/2006/main">
+  <p:cSld>
+    <p:spTree>
+      <p:nvGrpSpPr>
+        <p:cNvPr id="1" name=""/>
+        <p:cNvGrpSpPr/>
+        <p:nvPr/>
+      </p:nvGrpSpPr>
+      <p:grpSpPr>
+        <a:xfrm>
+          <a:off x="0" y="0"/>
+          <a:ext cx="0" cy="0"/>
+          <a:chOff x="0" y="0"/>
+          <a:chExt cx="0" cy="0"/>
+        </a:xfrm>
+      </p:grpSpPr>
+      <p:sp>
+        <p:nvSpPr>
+          <p:cNvPr id="4" name="Date Placeholder 3"/>
+          <p:cNvSpPr>
+            <a:spLocks noGrp="1"/>
+          </p:cNvSpPr>
+          <p:nvPr>
+            <p:ph type="dt" sz="half" idx="10"/>
+          </p:nvPr>
+        </p:nvSpPr>
+        <p:spPr/>
+        <p:txBody>
+          <a:bodyPr/>
+          <a:lstStyle/>
+          <a:p>
+            <a:pPr>
+              <a:defRPr/>
+            </a:pPr>
+            <a:r>
+              <a:rPr lang="de-DE" altLang="de-DE" smtClean="0"/>
+              <a:t>2020-10-08</a:t>
+            </a:r>
+            <a:endParaRPr lang="de-DE" altLang="en-US"/>
+          </a:p>
+        </p:txBody>
+      </p:sp>
+      <p:sp>
+        <p:nvSpPr>
+          <p:cNvPr id="5" name="Footer Placeholder 4"/>
+          <p:cNvSpPr>
+            <a:spLocks noGrp="1"/>
+          </p:cNvSpPr>
+          <p:nvPr>
+            <p:ph type="ftr" sz="quarter" idx="11"/>
+          </p:nvPr>
+        </p:nvSpPr>
+        <p:spPr/>
+        <p:txBody>
+          <a:bodyPr/>
+          <a:lstStyle/>
+          <a:p>
+            <a:pPr>
+              <a:defRPr/>
+            </a:pPr>
+            <a:r>
+              <a:rPr lang="de-DE" altLang="en-US" smtClean="0"/>
+              <a:t>Greenfox</a:t>
+            </a:r>
+            <a:endParaRPr lang="de-DE" altLang="en-US"/>
+          </a:p>
+        </p:txBody>
+      </p:sp>
+      <p:sp>
+        <p:nvSpPr>
+          <p:cNvPr id="6" name="Slide Number Placeholder 5"/>
+          <p:cNvSpPr>
+            <a:spLocks noGrp="1"/>
+          </p:cNvSpPr>
+          <p:nvPr>
+            <p:ph type="sldNum" sz="quarter" idx="12"/>
+          </p:nvPr>
+        </p:nvSpPr>
+        <p:spPr/>
+        <p:txBody>
+          <a:bodyPr/>
+          <a:lstStyle/>
+          <a:p>
+            <a:pPr>
+              <a:defRPr/>
+            </a:pPr>
+            <a:fld id="{F031B2F4-27D1-4E53-97CF-1947CD75B185}" type="slidenum">
+              <a:rPr lang="de-DE" altLang="en-US" smtClean="0"/>
+              <a:pPr>
+                <a:defRPr/>
+              </a:pPr>
+              <a:t>6</a:t>
+            </a:fld>
+            <a:endParaRPr lang="de-DE" altLang="en-US"/>
+          </a:p>
+        </p:txBody>
+      </p:sp>
+      <p:pic>
+        <p:nvPicPr>
+          <p:cNvPr id="7" name="Picture 6"/>
+          <p:cNvPicPr>
+            <a:picLocks noChangeAspect="1"/>
+          </p:cNvPicPr>
+          <p:nvPr/>
+        </p:nvPicPr>
+        <p:blipFill>
+          <a:blip r:embed="rId2">
+            <a:extLst>
+              <a:ext uri="{28A0092B-C50C-407E-A947-70E740481C1C}">
+                <a14:useLocalDpi xmlns:a14="http://schemas.microsoft.com/office/drawing/2010/main" val="0"/>
+              </a:ext>
+            </a:extLst>
+          </a:blip>
+          <a:stretch>
+            <a:fillRect/>
+          </a:stretch>
+        </p:blipFill>
+        <p:spPr>
+          <a:xfrm>
+            <a:off x="2414016" y="116632"/>
+            <a:ext cx="4315968" cy="5870448"/>
+          </a:xfrm>
+          <a:prstGeom prst="rect">
+            <a:avLst/>
+          </a:prstGeom>
+        </p:spPr>
+      </p:pic>
+      <p:sp>
+        <p:nvSpPr>
+          <p:cNvPr id="8" name="TextBox 7"/>
+          <p:cNvSpPr txBox="1"/>
+          <p:nvPr/>
+        </p:nvSpPr>
+        <p:spPr>
+          <a:xfrm>
+            <a:off x="1521769" y="2492896"/>
+            <a:ext cx="5832046" cy="830997"/>
+          </a:xfrm>
+          <a:prstGeom prst="rect">
+            <a:avLst/>
+          </a:prstGeom>
+          <a:noFill/>
+        </p:spPr>
+        <p:txBody>
+          <a:bodyPr wrap="none" rtlCol="0">
+            <a:spAutoFit/>
+          </a:bodyPr>
+          <a:lstStyle/>
+          <a:p>
+            <a:r>
+              <a:rPr lang="de-DE" sz="2400" smtClean="0">
+                <a:latin typeface="Bradley Hand ITC" panose="03070402050302030203" pitchFamily="66" charset="0"/>
+              </a:rPr>
+              <a:t>(having made up his mind to participate</a:t>
+            </a:r>
+          </a:p>
+          <a:p>
+            <a:r>
+              <a:rPr lang="de-DE" sz="2400" smtClean="0">
+                <a:latin typeface="Bradley Hand ITC" panose="03070402050302030203" pitchFamily="66" charset="0"/>
+              </a:rPr>
+              <a:t>In the Greenfox tutorial at Decl. Amst. 2020</a:t>
+            </a:r>
+            <a:endParaRPr lang="de-DE" sz="2400">
+              <a:latin typeface="Bradley Hand ITC" panose="03070402050302030203" pitchFamily="66" charset="0"/>
+            </a:endParaRPr>
+          </a:p>
+        </p:txBody>
+      </p:sp>
+      <p:sp>
+        <p:nvSpPr>
+          <p:cNvPr id="9" name="TextBox 8"/>
+          <p:cNvSpPr txBox="1"/>
+          <p:nvPr/>
+        </p:nvSpPr>
+        <p:spPr>
+          <a:xfrm>
+            <a:off x="6372200" y="5702242"/>
+            <a:ext cx="1954381" cy="369332"/>
+          </a:xfrm>
+          <a:prstGeom prst="rect">
+            <a:avLst/>
+          </a:prstGeom>
+          <a:noFill/>
+        </p:spPr>
+        <p:txBody>
+          <a:bodyPr wrap="none" rtlCol="0">
+            <a:spAutoFit/>
+          </a:bodyPr>
+          <a:lstStyle/>
+          <a:p>
+            <a:r>
+              <a:rPr lang="de-DE" smtClean="0">
+                <a:latin typeface="Bradley Hand ITC" panose="03070402050302030203" pitchFamily="66" charset="0"/>
+              </a:rPr>
+              <a:t>By Cédric Philippe</a:t>
+            </a:r>
+            <a:endParaRPr lang="de-DE">
+              <a:latin typeface="Bradley Hand ITC" panose="03070402050302030203" pitchFamily="66" charset="0"/>
+            </a:endParaRPr>
+          </a:p>
+        </p:txBody>
+      </p:sp>
+    </p:spTree>
+    <p:extLst>
+      <p:ext uri="{BB962C8B-B14F-4D97-AF65-F5344CB8AC3E}">
+        <p14:creationId xmlns:p14="http://schemas.microsoft.com/office/powerpoint/2010/main" val="2956608209"/>
+      </p:ext>
+    </p:extLst>
+  </p:cSld>
+  <p:clrMapOvr>
+    <a:masterClrMapping/>
+  </p:clrMapOvr>
+</p:sld>
+</file>
+
+<file path=ppt/slides/slide7.xml><?xml version="1.0" encoding="utf-8"?>
+<p:sld xmlns:a="http://schemas.openxmlformats.org/drawingml/2006/main" xmlns:r="http://schemas.openxmlformats.org/officeDocument/2006/relationships" xmlns:p="http://schemas.openxmlformats.org/presentationml/2006/main">
+  <p:cSld>
+    <p:spTree>
+      <p:nvGrpSpPr>
+        <p:cNvPr id="1" name=""/>
+        <p:cNvGrpSpPr/>
+        <p:nvPr/>
+      </p:nvGrpSpPr>
+      <p:grpSpPr>
+        <a:xfrm>
+          <a:off x="0" y="0"/>
+          <a:ext cx="0" cy="0"/>
+          <a:chOff x="0" y="0"/>
+          <a:chExt cx="0" cy="0"/>
+        </a:xfrm>
+      </p:grpSpPr>
+      <p:sp>
+        <p:nvSpPr>
+          <p:cNvPr id="2" name="Title 1"/>
+          <p:cNvSpPr>
+            <a:spLocks noGrp="1"/>
+          </p:cNvSpPr>
+          <p:nvPr>
+            <p:ph type="title"/>
+          </p:nvPr>
+        </p:nvSpPr>
+        <p:spPr/>
+        <p:txBody>
+          <a:bodyPr/>
+          <a:lstStyle/>
+          <a:p>
+            <a:r>
+              <a:rPr lang="de-DE" smtClean="0">
+                <a:solidFill>
+                  <a:srgbClr val="006600"/>
+                </a:solidFill>
+              </a:rPr>
+              <a:t>Part 2: Big picture</a:t>
+            </a:r>
+            <a:endParaRPr lang="de-DE">
+              <a:solidFill>
+                <a:srgbClr val="006600"/>
+              </a:solidFill>
+            </a:endParaRPr>
+          </a:p>
+        </p:txBody>
+      </p:sp>
+      <p:sp>
+        <p:nvSpPr>
+          <p:cNvPr id="4" name="Date Placeholder 3"/>
+          <p:cNvSpPr>
+            <a:spLocks noGrp="1"/>
+          </p:cNvSpPr>
+          <p:nvPr>
+            <p:ph type="dt" sz="half" idx="10"/>
+          </p:nvPr>
+        </p:nvSpPr>
+        <p:spPr/>
+        <p:txBody>
+          <a:bodyPr/>
+          <a:lstStyle/>
+          <a:p>
+            <a:pPr>
+              <a:defRPr/>
+            </a:pPr>
+            <a:r>
+              <a:rPr lang="de-DE" altLang="de-DE" smtClean="0"/>
+              <a:t>2020-10-08</a:t>
+            </a:r>
+            <a:endParaRPr lang="de-DE" altLang="en-US"/>
+          </a:p>
+        </p:txBody>
+      </p:sp>
+      <p:sp>
+        <p:nvSpPr>
+          <p:cNvPr id="5" name="Footer Placeholder 4"/>
+          <p:cNvSpPr>
+            <a:spLocks noGrp="1"/>
+          </p:cNvSpPr>
+          <p:nvPr>
+            <p:ph type="ftr" sz="quarter" idx="11"/>
+          </p:nvPr>
+        </p:nvSpPr>
+        <p:spPr/>
+        <p:txBody>
+          <a:bodyPr/>
+          <a:lstStyle/>
+          <a:p>
+            <a:pPr>
+              <a:defRPr/>
+            </a:pPr>
+            <a:r>
+              <a:rPr lang="de-DE" altLang="en-US" smtClean="0"/>
+              <a:t>Greenfox</a:t>
+            </a:r>
+            <a:endParaRPr lang="de-DE" altLang="en-US"/>
+          </a:p>
+        </p:txBody>
+      </p:sp>
+      <p:sp>
+        <p:nvSpPr>
+          <p:cNvPr id="6" name="Slide Number Placeholder 5"/>
+          <p:cNvSpPr>
+            <a:spLocks noGrp="1"/>
+          </p:cNvSpPr>
+          <p:nvPr>
+            <p:ph type="sldNum" sz="quarter" idx="12"/>
+          </p:nvPr>
+        </p:nvSpPr>
+        <p:spPr/>
+        <p:txBody>
+          <a:bodyPr/>
+          <a:lstStyle/>
+          <a:p>
+            <a:pPr>
+              <a:defRPr/>
+            </a:pPr>
+            <a:fld id="{F031B2F4-27D1-4E53-97CF-1947CD75B185}" type="slidenum">
+              <a:rPr lang="de-DE" altLang="en-US" smtClean="0"/>
+              <a:pPr>
+                <a:defRPr/>
+              </a:pPr>
+              <a:t>7</a:t>
+            </a:fld>
+            <a:endParaRPr lang="de-DE" altLang="en-US"/>
+          </a:p>
+        </p:txBody>
+      </p:sp>
+      <p:sp>
+        <p:nvSpPr>
+          <p:cNvPr id="7" name="TextBox 6"/>
+          <p:cNvSpPr txBox="1"/>
+          <p:nvPr/>
+        </p:nvSpPr>
+        <p:spPr>
+          <a:xfrm>
+            <a:off x="683568" y="2348880"/>
+            <a:ext cx="8316416" cy="1692771"/>
+          </a:xfrm>
+          <a:prstGeom prst="rect">
+            <a:avLst/>
+          </a:prstGeom>
+          <a:noFill/>
+        </p:spPr>
+        <p:txBody>
+          <a:bodyPr wrap="square" rtlCol="0">
+            <a:spAutoFit/>
+          </a:bodyPr>
+          <a:lstStyle/>
+          <a:p>
+            <a:r>
+              <a:rPr lang="de-DE" sz="3200" smtClean="0">
+                <a:solidFill>
+                  <a:srgbClr val="006600"/>
+                </a:solidFill>
+                <a:latin typeface="Calibri Light" panose="020F0302020204030204" pitchFamily="34" charset="0"/>
+                <a:cs typeface="Calibri Light" panose="020F0302020204030204" pitchFamily="34" charset="0"/>
+              </a:rPr>
+              <a:t>The key to understanding Greenfox is knowing</a:t>
+            </a:r>
+          </a:p>
+          <a:p>
+            <a:endParaRPr lang="de-DE" sz="3200">
+              <a:solidFill>
+                <a:srgbClr val="006600"/>
+              </a:solidFill>
+              <a:latin typeface="Calibri Light" panose="020F0302020204030204" pitchFamily="34" charset="0"/>
+              <a:cs typeface="Calibri Light" panose="020F0302020204030204" pitchFamily="34" charset="0"/>
+            </a:endParaRPr>
+          </a:p>
+          <a:p>
+            <a:r>
+              <a:rPr lang="de-DE" sz="4000" smtClean="0">
+                <a:solidFill>
+                  <a:srgbClr val="006600"/>
+                </a:solidFill>
+                <a:latin typeface="Calibri Light" panose="020F0302020204030204" pitchFamily="34" charset="0"/>
+                <a:cs typeface="Calibri Light" panose="020F0302020204030204" pitchFamily="34" charset="0"/>
+              </a:rPr>
+              <a:t>                     </a:t>
+            </a:r>
+            <a:r>
+              <a:rPr lang="de-DE" sz="4000" i="1" smtClean="0">
+                <a:solidFill>
+                  <a:srgbClr val="006600"/>
+                </a:solidFill>
+                <a:latin typeface="Calibri Light" panose="020F0302020204030204" pitchFamily="34" charset="0"/>
+                <a:cs typeface="Calibri Light" panose="020F0302020204030204" pitchFamily="34" charset="0"/>
+              </a:rPr>
+              <a:t>SEVEN THINGS</a:t>
+            </a:r>
+            <a:endParaRPr lang="de-DE" sz="4000" i="1">
+              <a:solidFill>
+                <a:srgbClr val="006600"/>
+              </a:solidFill>
+              <a:latin typeface="Calibri Light" panose="020F0302020204030204" pitchFamily="34" charset="0"/>
+              <a:cs typeface="Calibri Light" panose="020F0302020204030204" pitchFamily="34" charset="0"/>
+            </a:endParaRPr>
+          </a:p>
+        </p:txBody>
+      </p:sp>
+    </p:spTree>
+    <p:extLst>
+      <p:ext uri="{BB962C8B-B14F-4D97-AF65-F5344CB8AC3E}">
+        <p14:creationId xmlns:p14="http://schemas.microsoft.com/office/powerpoint/2010/main" val="3307396706"/>
+      </p:ext>
+    </p:extLst>
+  </p:cSld>
+  <p:clrMapOvr>
+    <a:masterClrMapping/>
+  </p:clrMapOvr>
+</p:sld>
+</file>
+
+<file path=ppt/slides/slide8.xml><?xml version="1.0" encoding="utf-8"?>
+<p:sld xmlns:a="http://schemas.openxmlformats.org/drawingml/2006/main" xmlns:r="http://schemas.openxmlformats.org/officeDocument/2006/relationships" xmlns:p="http://schemas.openxmlformats.org/presentationml/2006/main">
+  <p:cSld>
+    <p:spTree>
+      <p:nvGrpSpPr>
+        <p:cNvPr id="1" name=""/>
+        <p:cNvGrpSpPr/>
+        <p:nvPr/>
+      </p:nvGrpSpPr>
+      <p:grpSpPr>
+        <a:xfrm>
+          <a:off x="0" y="0"/>
+          <a:ext cx="0" cy="0"/>
+          <a:chOff x="0" y="0"/>
+          <a:chExt cx="0" cy="0"/>
+        </a:xfrm>
+      </p:grpSpPr>
+      <p:sp>
+        <p:nvSpPr>
+          <p:cNvPr id="2" name="Title 1"/>
+          <p:cNvSpPr>
+            <a:spLocks noGrp="1"/>
+          </p:cNvSpPr>
+          <p:nvPr>
+            <p:ph type="title"/>
+          </p:nvPr>
+        </p:nvSpPr>
+        <p:spPr/>
+        <p:txBody>
+          <a:bodyPr/>
+          <a:lstStyle/>
+          <a:p>
+            <a:r>
+              <a:rPr lang="de-DE" smtClean="0">
+                <a:solidFill>
+                  <a:srgbClr val="006600"/>
+                </a:solidFill>
+                <a:latin typeface="Calibri Light" panose="020F0302020204030204" pitchFamily="34" charset="0"/>
+                <a:cs typeface="Calibri Light" panose="020F0302020204030204" pitchFamily="34" charset="0"/>
+              </a:rPr>
+              <a:t>SEVEN THINGS</a:t>
+            </a:r>
+            <a:endParaRPr lang="de-DE">
+              <a:solidFill>
+                <a:srgbClr val="006600"/>
+              </a:solidFill>
+              <a:latin typeface="Calibri Light" panose="020F0302020204030204" pitchFamily="34" charset="0"/>
+              <a:cs typeface="Calibri Light" panose="020F0302020204030204" pitchFamily="34" charset="0"/>
+            </a:endParaRPr>
+          </a:p>
+        </p:txBody>
+      </p:sp>
+      <p:sp>
+        <p:nvSpPr>
+          <p:cNvPr id="3" name="Content Placeholder 2"/>
+          <p:cNvSpPr>
+            <a:spLocks noGrp="1"/>
+          </p:cNvSpPr>
+          <p:nvPr>
+            <p:ph idx="1"/>
+          </p:nvPr>
+        </p:nvSpPr>
+        <p:spPr/>
+        <p:txBody>
+          <a:bodyPr/>
+          <a:lstStyle/>
+          <a:p>
+            <a:r>
+              <a:rPr lang="de-DE" smtClean="0">
+                <a:solidFill>
+                  <a:srgbClr val="006600"/>
+                </a:solidFill>
+                <a:latin typeface="Calibri Light" panose="020F0302020204030204" pitchFamily="34" charset="0"/>
+                <a:cs typeface="Calibri Light" panose="020F0302020204030204" pitchFamily="34" charset="0"/>
+              </a:rPr>
+              <a:t>Resources</a:t>
+            </a:r>
+          </a:p>
+          <a:p>
+            <a:r>
+              <a:rPr lang="de-DE" smtClean="0">
+                <a:solidFill>
+                  <a:srgbClr val="006600"/>
+                </a:solidFill>
+                <a:latin typeface="Calibri Light" panose="020F0302020204030204" pitchFamily="34" charset="0"/>
+                <a:cs typeface="Calibri Light" panose="020F0302020204030204" pitchFamily="34" charset="0"/>
+              </a:rPr>
+              <a:t>Constraints</a:t>
+            </a:r>
+          </a:p>
+          <a:p>
+            <a:r>
+              <a:rPr lang="de-DE" smtClean="0">
+                <a:solidFill>
+                  <a:srgbClr val="006600"/>
+                </a:solidFill>
+                <a:latin typeface="Calibri Light" panose="020F0302020204030204" pitchFamily="34" charset="0"/>
+                <a:cs typeface="Calibri Light" panose="020F0302020204030204" pitchFamily="34" charset="0"/>
+              </a:rPr>
+              <a:t>Shapes</a:t>
+            </a:r>
+          </a:p>
+          <a:p>
+            <a:r>
+              <a:rPr lang="de-DE" smtClean="0">
+                <a:solidFill>
+                  <a:srgbClr val="006600"/>
+                </a:solidFill>
+                <a:latin typeface="Calibri Light" panose="020F0302020204030204" pitchFamily="34" charset="0"/>
+                <a:cs typeface="Calibri Light" panose="020F0302020204030204" pitchFamily="34" charset="0"/>
+              </a:rPr>
+              <a:t>Target declarations</a:t>
+            </a:r>
+          </a:p>
+          <a:p>
+            <a:r>
+              <a:rPr lang="de-DE" smtClean="0">
+                <a:solidFill>
+                  <a:srgbClr val="006600"/>
+                </a:solidFill>
+                <a:latin typeface="Calibri Light" panose="020F0302020204030204" pitchFamily="34" charset="0"/>
+                <a:cs typeface="Calibri Light" panose="020F0302020204030204" pitchFamily="34" charset="0"/>
+              </a:rPr>
+              <a:t>Link definitions</a:t>
+            </a:r>
+          </a:p>
+          <a:p>
+            <a:r>
+              <a:rPr lang="de-DE" smtClean="0">
+                <a:solidFill>
+                  <a:srgbClr val="006600"/>
+                </a:solidFill>
+                <a:latin typeface="Calibri Light" panose="020F0302020204030204" pitchFamily="34" charset="0"/>
+                <a:cs typeface="Calibri Light" panose="020F0302020204030204" pitchFamily="34" charset="0"/>
+              </a:rPr>
+              <a:t>Results &amp; Reports</a:t>
+            </a:r>
+            <a:endParaRPr lang="de-DE">
+              <a:solidFill>
+                <a:srgbClr val="006600"/>
+              </a:solidFill>
+              <a:latin typeface="Calibri Light" panose="020F0302020204030204" pitchFamily="34" charset="0"/>
+              <a:cs typeface="Calibri Light" panose="020F0302020204030204" pitchFamily="34" charset="0"/>
+            </a:endParaRPr>
+          </a:p>
+        </p:txBody>
+      </p:sp>
+      <p:sp>
+        <p:nvSpPr>
+          <p:cNvPr id="4" name="Date Placeholder 3"/>
+          <p:cNvSpPr>
+            <a:spLocks noGrp="1"/>
+          </p:cNvSpPr>
+          <p:nvPr>
+            <p:ph type="dt" sz="half" idx="10"/>
+          </p:nvPr>
+        </p:nvSpPr>
+        <p:spPr/>
+        <p:txBody>
+          <a:bodyPr/>
+          <a:lstStyle/>
+          <a:p>
+            <a:pPr>
+              <a:defRPr/>
+            </a:pPr>
+            <a:r>
+              <a:rPr lang="de-DE" altLang="de-DE" smtClean="0"/>
+              <a:t>2020-10-08</a:t>
+            </a:r>
+            <a:endParaRPr lang="de-DE" altLang="en-US"/>
+          </a:p>
+        </p:txBody>
+      </p:sp>
+      <p:sp>
+        <p:nvSpPr>
+          <p:cNvPr id="5" name="Footer Placeholder 4"/>
+          <p:cNvSpPr>
+            <a:spLocks noGrp="1"/>
+          </p:cNvSpPr>
+          <p:nvPr>
+            <p:ph type="ftr" sz="quarter" idx="11"/>
+          </p:nvPr>
+        </p:nvSpPr>
+        <p:spPr/>
+        <p:txBody>
+          <a:bodyPr/>
+          <a:lstStyle/>
+          <a:p>
+            <a:pPr>
+              <a:defRPr/>
+            </a:pPr>
+            <a:r>
+              <a:rPr lang="de-DE" altLang="en-US" smtClean="0"/>
+              <a:t>Greenfox</a:t>
+            </a:r>
+            <a:endParaRPr lang="de-DE" altLang="en-US"/>
+          </a:p>
+        </p:txBody>
+      </p:sp>
+      <p:sp>
+        <p:nvSpPr>
+          <p:cNvPr id="6" name="Slide Number Placeholder 5"/>
+          <p:cNvSpPr>
+            <a:spLocks noGrp="1"/>
+          </p:cNvSpPr>
+          <p:nvPr>
+            <p:ph type="sldNum" sz="quarter" idx="12"/>
+          </p:nvPr>
+        </p:nvSpPr>
+        <p:spPr/>
+        <p:txBody>
+          <a:bodyPr/>
+          <a:lstStyle/>
+          <a:p>
+            <a:pPr>
+              <a:defRPr/>
+            </a:pPr>
+            <a:fld id="{F031B2F4-27D1-4E53-97CF-1947CD75B185}" type="slidenum">
+              <a:rPr lang="de-DE" altLang="en-US" smtClean="0"/>
+              <a:pPr>
+                <a:defRPr/>
+              </a:pPr>
+              <a:t>8</a:t>
+            </a:fld>
+            <a:endParaRPr lang="de-DE" altLang="en-US"/>
+          </a:p>
+        </p:txBody>
+      </p:sp>
+    </p:spTree>
+    <p:extLst>
+      <p:ext uri="{BB962C8B-B14F-4D97-AF65-F5344CB8AC3E}">
+        <p14:creationId xmlns:p14="http://schemas.microsoft.com/office/powerpoint/2010/main" val="4050824106"/>
+      </p:ext>
+    </p:extLst>
+  </p:cSld>
+  <p:clrMapOvr>
+    <a:masterClrMapping/>
+  </p:clrMapOvr>
+</p:sld>
+</file>
+
+<file path=ppt/slides/slide9.xml><?xml version="1.0" encoding="utf-8"?>
+<p:sld xmlns:a="http://schemas.openxmlformats.org/drawingml/2006/main" xmlns:r="http://schemas.openxmlformats.org/officeDocument/2006/relationships" xmlns:p="http://schemas.openxmlformats.org/presentationml/2006/main">
+  <p:cSld>
+    <p:spTree>
+      <p:nvGrpSpPr>
+        <p:cNvPr id="1" name=""/>
+        <p:cNvGrpSpPr/>
+        <p:nvPr/>
+      </p:nvGrpSpPr>
+      <p:grpSpPr>
+        <a:xfrm>
+          <a:off x="0" y="0"/>
+          <a:ext cx="0" cy="0"/>
+          <a:chOff x="0" y="0"/>
+          <a:chExt cx="0" cy="0"/>
+        </a:xfrm>
+      </p:grpSpPr>
+      <p:sp>
+        <p:nvSpPr>
+          <p:cNvPr id="2" name="Title 1"/>
+          <p:cNvSpPr>
+            <a:spLocks noGrp="1"/>
+          </p:cNvSpPr>
+          <p:nvPr>
+            <p:ph type="title"/>
+          </p:nvPr>
+        </p:nvSpPr>
+        <p:spPr/>
+        <p:txBody>
+          <a:bodyPr/>
+          <a:lstStyle/>
+          <a:p>
+            <a:r>
+              <a:rPr lang="de-DE" smtClean="0">
+                <a:solidFill>
+                  <a:srgbClr val="006600"/>
+                </a:solidFill>
+                <a:latin typeface="Calibri Light" panose="020F0302020204030204" pitchFamily="34" charset="0"/>
+                <a:cs typeface="Calibri Light" panose="020F0302020204030204" pitchFamily="34" charset="0"/>
+              </a:rPr>
+              <a:t>RESOURCES</a:t>
+            </a:r>
+            <a:endParaRPr lang="de-DE">
+              <a:solidFill>
+                <a:srgbClr val="006600"/>
+              </a:solidFill>
+              <a:latin typeface="Calibri Light" panose="020F0302020204030204" pitchFamily="34" charset="0"/>
+              <a:cs typeface="Calibri Light" panose="020F0302020204030204" pitchFamily="34" charset="0"/>
+            </a:endParaRPr>
+          </a:p>
+        </p:txBody>
+      </p:sp>
+      <p:sp>
+        <p:nvSpPr>
+          <p:cNvPr id="3" name="Content Placeholder 2"/>
+          <p:cNvSpPr>
+            <a:spLocks noGrp="1"/>
+          </p:cNvSpPr>
+          <p:nvPr>
+            <p:ph idx="1"/>
+          </p:nvPr>
+        </p:nvSpPr>
+        <p:spPr/>
+        <p:txBody>
+          <a:bodyPr/>
+          <a:lstStyle/>
+          <a:p>
+            <a:r>
+              <a:rPr lang="de-DE" smtClean="0">
+                <a:solidFill>
+                  <a:srgbClr val="006600"/>
+                </a:solidFill>
+                <a:latin typeface="Calibri Light" panose="020F0302020204030204" pitchFamily="34" charset="0"/>
+                <a:cs typeface="Calibri Light" panose="020F0302020204030204" pitchFamily="34" charset="0"/>
+              </a:rPr>
+              <a:t>Resources = files &amp; folders</a:t>
+            </a:r>
+          </a:p>
+        </p:txBody>
+      </p:sp>
+      <p:sp>
+        <p:nvSpPr>
+          <p:cNvPr id="4" name="Date Placeholder 3"/>
+          <p:cNvSpPr>
+            <a:spLocks noGrp="1"/>
+          </p:cNvSpPr>
+          <p:nvPr>
+            <p:ph type="dt" sz="half" idx="10"/>
+          </p:nvPr>
+        </p:nvSpPr>
+        <p:spPr/>
+        <p:txBody>
+          <a:bodyPr/>
+          <a:lstStyle/>
+          <a:p>
+            <a:pPr>
+              <a:defRPr/>
+            </a:pPr>
+            <a:r>
+              <a:rPr lang="de-DE" altLang="de-DE" smtClean="0"/>
+              <a:t>2020-10-08</a:t>
+            </a:r>
+            <a:endParaRPr lang="de-DE" altLang="en-US"/>
+          </a:p>
+        </p:txBody>
+      </p:sp>
+      <p:sp>
+        <p:nvSpPr>
+          <p:cNvPr id="5" name="Footer Placeholder 4"/>
+          <p:cNvSpPr>
+            <a:spLocks noGrp="1"/>
+          </p:cNvSpPr>
+          <p:nvPr>
+            <p:ph type="ftr" sz="quarter" idx="11"/>
+          </p:nvPr>
+        </p:nvSpPr>
+        <p:spPr/>
+        <p:txBody>
+          <a:bodyPr/>
+          <a:lstStyle/>
+          <a:p>
+            <a:pPr>
+              <a:defRPr/>
+            </a:pPr>
+            <a:r>
+              <a:rPr lang="de-DE" altLang="en-US" smtClean="0"/>
+              <a:t>Greenfox</a:t>
+            </a:r>
+            <a:endParaRPr lang="de-DE" altLang="en-US"/>
+          </a:p>
+        </p:txBody>
+      </p:sp>
+      <p:sp>
+        <p:nvSpPr>
+          <p:cNvPr id="6" name="Slide Number Placeholder 5"/>
+          <p:cNvSpPr>
+            <a:spLocks noGrp="1"/>
+          </p:cNvSpPr>
+          <p:nvPr>
+            <p:ph type="sldNum" sz="quarter" idx="12"/>
+          </p:nvPr>
+        </p:nvSpPr>
+        <p:spPr/>
+        <p:txBody>
+          <a:bodyPr/>
+          <a:lstStyle/>
+          <a:p>
+            <a:pPr>
+              <a:defRPr/>
+            </a:pPr>
+            <a:fld id="{F031B2F4-27D1-4E53-97CF-1947CD75B185}" type="slidenum">
+              <a:rPr lang="de-DE" altLang="en-US" smtClean="0"/>
+              <a:pPr>
+                <a:defRPr/>
+              </a:pPr>
+              <a:t>9</a:t>
+            </a:fld>
+            <a:endParaRPr lang="de-DE" altLang="en-US"/>
+          </a:p>
+        </p:txBody>
+      </p:sp>
+      <p:sp>
+        <p:nvSpPr>
+          <p:cNvPr id="7" name="TextBox 6"/>
+          <p:cNvSpPr txBox="1"/>
+          <p:nvPr/>
+        </p:nvSpPr>
+        <p:spPr>
+          <a:xfrm>
+            <a:off x="6156176" y="5291916"/>
+            <a:ext cx="2572051" cy="461665"/>
+          </a:xfrm>
+          <a:prstGeom prst="rect">
+            <a:avLst/>
+          </a:prstGeom>
+          <a:noFill/>
+        </p:spPr>
+        <p:txBody>
+          <a:bodyPr wrap="none" rtlCol="0">
+            <a:spAutoFit/>
+          </a:bodyPr>
+          <a:lstStyle/>
+          <a:p>
+            <a:r>
+              <a:rPr lang="de-DE" sz="2400" i="1" smtClean="0">
+                <a:solidFill>
+                  <a:srgbClr val="006600"/>
+                </a:solidFill>
+                <a:latin typeface="Calibri Light" panose="020F0302020204030204" pitchFamily="34" charset="0"/>
+                <a:cs typeface="Calibri Light" panose="020F0302020204030204" pitchFamily="34" charset="0"/>
+              </a:rPr>
+              <a:t>Now that was easy!</a:t>
+            </a:r>
+            <a:endParaRPr lang="de-DE" sz="2400" i="1">
+              <a:solidFill>
+                <a:srgbClr val="006600"/>
+              </a:solidFill>
+              <a:latin typeface="Calibri Light" panose="020F0302020204030204" pitchFamily="34" charset="0"/>
+              <a:cs typeface="Calibri Light" panose="020F0302020204030204" pitchFamily="34" charset="0"/>
+            </a:endParaRPr>
+          </a:p>
+        </p:txBody>
+      </p:sp>
+    </p:spTree>
+    <p:extLst>
+      <p:ext uri="{BB962C8B-B14F-4D97-AF65-F5344CB8AC3E}">
+        <p14:creationId xmlns:p14="http://schemas.microsoft.com/office/powerpoint/2010/main" val="1046140074"/>
+      </p:ext>
+    </p:extLst>
+  </p:cSld>
+  <p:clrMapOvr>
+    <a:masterClrMapping/>
+  </p:clrMapOvr>
 </p:sld>
 </file>
 

</xml_diff>